<commit_message>
SNR subjective measures update
</commit_message>
<xml_diff>
--- a/data analysis/alpha_SNR_2017-10-12.pptx
+++ b/data analysis/alpha_SNR_2017-10-12.pptx
@@ -5,7 +5,7 @@
     <p:sldMasterId id="2147483648" r:id="rId1"/>
   </p:sldMasterIdLst>
   <p:notesMasterIdLst>
-    <p:notesMasterId r:id="rId14"/>
+    <p:notesMasterId r:id="rId12"/>
   </p:notesMasterIdLst>
   <p:sldIdLst>
     <p:sldId id="256" r:id="rId2"/>
@@ -13,13 +13,11 @@
     <p:sldId id="261" r:id="rId4"/>
     <p:sldId id="262" r:id="rId5"/>
     <p:sldId id="263" r:id="rId6"/>
-    <p:sldId id="264" r:id="rId7"/>
-    <p:sldId id="266" r:id="rId8"/>
-    <p:sldId id="267" r:id="rId9"/>
-    <p:sldId id="268" r:id="rId10"/>
-    <p:sldId id="269" r:id="rId11"/>
-    <p:sldId id="270" r:id="rId12"/>
-    <p:sldId id="265" r:id="rId13"/>
+    <p:sldId id="269" r:id="rId7"/>
+    <p:sldId id="271" r:id="rId8"/>
+    <p:sldId id="270" r:id="rId9"/>
+    <p:sldId id="272" r:id="rId10"/>
+    <p:sldId id="265" r:id="rId11"/>
   </p:sldIdLst>
   <p:sldSz cx="12192000" cy="6858000"/>
   <p:notesSz cx="6858000" cy="9144000"/>
@@ -128,12 +126,10 @@
             <p14:sldId id="261"/>
             <p14:sldId id="262"/>
             <p14:sldId id="263"/>
-            <p14:sldId id="264"/>
-            <p14:sldId id="266"/>
-            <p14:sldId id="267"/>
-            <p14:sldId id="268"/>
             <p14:sldId id="269"/>
+            <p14:sldId id="271"/>
             <p14:sldId id="270"/>
+            <p14:sldId id="272"/>
             <p14:sldId id="265"/>
           </p14:sldIdLst>
         </p14:section>
@@ -231,7 +227,7 @@
           <a:p>
             <a:fld id="{7632A2B4-7209-462E-905F-37D9BF206B00}" type="datetimeFigureOut">
               <a:rPr lang="en-US" smtClean="0"/>
-              <a:t>10/12/2017</a:t>
+              <a:t>1/9/2018</a:t>
             </a:fld>
             <a:endParaRPr lang="en-US"/>
           </a:p>
@@ -714,7 +710,7 @@
           <a:p>
             <a:fld id="{6F81013B-5B06-4D28-96F1-D627B35C6F6A}" type="datetimeFigureOut">
               <a:rPr lang="en-US" smtClean="0"/>
-              <a:t>10/12/2017</a:t>
+              <a:t>1/9/2018</a:t>
             </a:fld>
             <a:endParaRPr lang="en-US"/>
           </a:p>
@@ -884,7 +880,7 @@
           <a:p>
             <a:fld id="{6F81013B-5B06-4D28-96F1-D627B35C6F6A}" type="datetimeFigureOut">
               <a:rPr lang="en-US" smtClean="0"/>
-              <a:t>10/12/2017</a:t>
+              <a:t>1/9/2018</a:t>
             </a:fld>
             <a:endParaRPr lang="en-US"/>
           </a:p>
@@ -1064,7 +1060,7 @@
           <a:p>
             <a:fld id="{6F81013B-5B06-4D28-96F1-D627B35C6F6A}" type="datetimeFigureOut">
               <a:rPr lang="en-US" smtClean="0"/>
-              <a:t>10/12/2017</a:t>
+              <a:t>1/9/2018</a:t>
             </a:fld>
             <a:endParaRPr lang="en-US"/>
           </a:p>
@@ -1234,7 +1230,7 @@
           <a:p>
             <a:fld id="{6F81013B-5B06-4D28-96F1-D627B35C6F6A}" type="datetimeFigureOut">
               <a:rPr lang="en-US" smtClean="0"/>
-              <a:t>10/12/2017</a:t>
+              <a:t>1/9/2018</a:t>
             </a:fld>
             <a:endParaRPr lang="en-US"/>
           </a:p>
@@ -1480,7 +1476,7 @@
           <a:p>
             <a:fld id="{6F81013B-5B06-4D28-96F1-D627B35C6F6A}" type="datetimeFigureOut">
               <a:rPr lang="en-US" smtClean="0"/>
-              <a:t>10/12/2017</a:t>
+              <a:t>1/9/2018</a:t>
             </a:fld>
             <a:endParaRPr lang="en-US"/>
           </a:p>
@@ -1712,7 +1708,7 @@
           <a:p>
             <a:fld id="{6F81013B-5B06-4D28-96F1-D627B35C6F6A}" type="datetimeFigureOut">
               <a:rPr lang="en-US" smtClean="0"/>
-              <a:t>10/12/2017</a:t>
+              <a:t>1/9/2018</a:t>
             </a:fld>
             <a:endParaRPr lang="en-US"/>
           </a:p>
@@ -2079,7 +2075,7 @@
           <a:p>
             <a:fld id="{6F81013B-5B06-4D28-96F1-D627B35C6F6A}" type="datetimeFigureOut">
               <a:rPr lang="en-US" smtClean="0"/>
-              <a:t>10/12/2017</a:t>
+              <a:t>1/9/2018</a:t>
             </a:fld>
             <a:endParaRPr lang="en-US"/>
           </a:p>
@@ -2197,7 +2193,7 @@
           <a:p>
             <a:fld id="{6F81013B-5B06-4D28-96F1-D627B35C6F6A}" type="datetimeFigureOut">
               <a:rPr lang="en-US" smtClean="0"/>
-              <a:t>10/12/2017</a:t>
+              <a:t>1/9/2018</a:t>
             </a:fld>
             <a:endParaRPr lang="en-US"/>
           </a:p>
@@ -2292,7 +2288,7 @@
           <a:p>
             <a:fld id="{6F81013B-5B06-4D28-96F1-D627B35C6F6A}" type="datetimeFigureOut">
               <a:rPr lang="en-US" smtClean="0"/>
-              <a:t>10/12/2017</a:t>
+              <a:t>1/9/2018</a:t>
             </a:fld>
             <a:endParaRPr lang="en-US"/>
           </a:p>
@@ -2569,7 +2565,7 @@
           <a:p>
             <a:fld id="{6F81013B-5B06-4D28-96F1-D627B35C6F6A}" type="datetimeFigureOut">
               <a:rPr lang="en-US" smtClean="0"/>
-              <a:t>10/12/2017</a:t>
+              <a:t>1/9/2018</a:t>
             </a:fld>
             <a:endParaRPr lang="en-US"/>
           </a:p>
@@ -2822,7 +2818,7 @@
           <a:p>
             <a:fld id="{6F81013B-5B06-4D28-96F1-D627B35C6F6A}" type="datetimeFigureOut">
               <a:rPr lang="en-US" smtClean="0"/>
-              <a:t>10/12/2017</a:t>
+              <a:t>1/9/2018</a:t>
             </a:fld>
             <a:endParaRPr lang="en-US"/>
           </a:p>
@@ -3035,7 +3031,7 @@
           <a:p>
             <a:fld id="{6F81013B-5B06-4D28-96F1-D627B35C6F6A}" type="datetimeFigureOut">
               <a:rPr lang="en-US" smtClean="0"/>
-              <a:t>10/12/2017</a:t>
+              <a:t>1/9/2018</a:t>
             </a:fld>
             <a:endParaRPr lang="en-US"/>
           </a:p>
@@ -3815,254 +3811,6 @@
           <a:bodyPr/>
           <a:lstStyle/>
           <a:p>
-            <a:endParaRPr lang="en-US"/>
-          </a:p>
-        </p:txBody>
-      </p:sp>
-      <p:sp>
-        <p:nvSpPr>
-          <p:cNvPr id="3" name="Content Placeholder 2"/>
-          <p:cNvSpPr>
-            <a:spLocks noGrp="1"/>
-          </p:cNvSpPr>
-          <p:nvPr>
-            <p:ph idx="1"/>
-          </p:nvPr>
-        </p:nvSpPr>
-        <p:spPr/>
-        <p:txBody>
-          <a:bodyPr/>
-          <a:lstStyle/>
-          <a:p>
-            <a:endParaRPr lang="en-US"/>
-          </a:p>
-        </p:txBody>
-      </p:sp>
-      <p:pic>
-        <p:nvPicPr>
-          <p:cNvPr id="4" name="Picture 3"/>
-          <p:cNvPicPr>
-            <a:picLocks noChangeAspect="1"/>
-          </p:cNvPicPr>
-          <p:nvPr/>
-        </p:nvPicPr>
-        <p:blipFill>
-          <a:blip r:embed="rId2"/>
-          <a:stretch>
-            <a:fillRect/>
-          </a:stretch>
-        </p:blipFill>
-        <p:spPr>
-          <a:xfrm>
-            <a:off x="483315" y="100584"/>
-            <a:ext cx="11225370" cy="6858000"/>
-          </a:xfrm>
-          <a:prstGeom prst="rect">
-            <a:avLst/>
-          </a:prstGeom>
-        </p:spPr>
-      </p:pic>
-      <p:sp>
-        <p:nvSpPr>
-          <p:cNvPr id="5" name="TextBox 4"/>
-          <p:cNvSpPr txBox="1"/>
-          <p:nvPr/>
-        </p:nvSpPr>
-        <p:spPr>
-          <a:xfrm>
-            <a:off x="4639928" y="45522"/>
-            <a:ext cx="2912144" cy="369332"/>
-          </a:xfrm>
-          <a:prstGeom prst="rect">
-            <a:avLst/>
-          </a:prstGeom>
-          <a:noFill/>
-        </p:spPr>
-        <p:txBody>
-          <a:bodyPr wrap="none" rtlCol="0">
-            <a:spAutoFit/>
-          </a:bodyPr>
-          <a:lstStyle/>
-          <a:p>
-            <a:r>
-              <a:rPr lang="en-US" dirty="0" smtClean="0"/>
-              <a:t>SSQ 12: Individual Responses</a:t>
-            </a:r>
-            <a:endParaRPr lang="en-US" dirty="0"/>
-          </a:p>
-        </p:txBody>
-      </p:sp>
-    </p:spTree>
-    <p:extLst>
-      <p:ext uri="{BB962C8B-B14F-4D97-AF65-F5344CB8AC3E}">
-        <p14:creationId xmlns:p14="http://schemas.microsoft.com/office/powerpoint/2010/main" val="3907476511"/>
-      </p:ext>
-    </p:extLst>
-  </p:cSld>
-  <p:clrMapOvr>
-    <a:masterClrMapping/>
-  </p:clrMapOvr>
-</p:sld>
-</file>
-
-<file path=ppt/slides/slide11.xml><?xml version="1.0" encoding="utf-8"?>
-<p:sld xmlns:a="http://schemas.openxmlformats.org/drawingml/2006/main" xmlns:r="http://schemas.openxmlformats.org/officeDocument/2006/relationships" xmlns:p="http://schemas.openxmlformats.org/presentationml/2006/main">
-  <p:cSld>
-    <p:spTree>
-      <p:nvGrpSpPr>
-        <p:cNvPr id="1" name=""/>
-        <p:cNvGrpSpPr/>
-        <p:nvPr/>
-      </p:nvGrpSpPr>
-      <p:grpSpPr>
-        <a:xfrm>
-          <a:off x="0" y="0"/>
-          <a:ext cx="0" cy="0"/>
-          <a:chOff x="0" y="0"/>
-          <a:chExt cx="0" cy="0"/>
-        </a:xfrm>
-      </p:grpSpPr>
-      <p:sp>
-        <p:nvSpPr>
-          <p:cNvPr id="2" name="Title 1"/>
-          <p:cNvSpPr>
-            <a:spLocks noGrp="1"/>
-          </p:cNvSpPr>
-          <p:nvPr>
-            <p:ph type="title"/>
-          </p:nvPr>
-        </p:nvSpPr>
-        <p:spPr/>
-        <p:txBody>
-          <a:bodyPr/>
-          <a:lstStyle/>
-          <a:p>
-            <a:endParaRPr lang="en-US"/>
-          </a:p>
-        </p:txBody>
-      </p:sp>
-      <p:sp>
-        <p:nvSpPr>
-          <p:cNvPr id="3" name="Content Placeholder 2"/>
-          <p:cNvSpPr>
-            <a:spLocks noGrp="1"/>
-          </p:cNvSpPr>
-          <p:nvPr>
-            <p:ph idx="1"/>
-          </p:nvPr>
-        </p:nvSpPr>
-        <p:spPr/>
-        <p:txBody>
-          <a:bodyPr/>
-          <a:lstStyle/>
-          <a:p>
-            <a:endParaRPr lang="en-US"/>
-          </a:p>
-        </p:txBody>
-      </p:sp>
-      <p:pic>
-        <p:nvPicPr>
-          <p:cNvPr id="4" name="Picture 3"/>
-          <p:cNvPicPr>
-            <a:picLocks noChangeAspect="1"/>
-          </p:cNvPicPr>
-          <p:nvPr/>
-        </p:nvPicPr>
-        <p:blipFill>
-          <a:blip r:embed="rId2"/>
-          <a:stretch>
-            <a:fillRect/>
-          </a:stretch>
-        </p:blipFill>
-        <p:spPr>
-          <a:xfrm>
-            <a:off x="483315" y="109728"/>
-            <a:ext cx="11225370" cy="6858000"/>
-          </a:xfrm>
-          <a:prstGeom prst="rect">
-            <a:avLst/>
-          </a:prstGeom>
-        </p:spPr>
-      </p:pic>
-      <p:sp>
-        <p:nvSpPr>
-          <p:cNvPr id="5" name="TextBox 4"/>
-          <p:cNvSpPr txBox="1"/>
-          <p:nvPr/>
-        </p:nvSpPr>
-        <p:spPr>
-          <a:xfrm>
-            <a:off x="4639928" y="45522"/>
-            <a:ext cx="2525820" cy="369332"/>
-          </a:xfrm>
-          <a:prstGeom prst="rect">
-            <a:avLst/>
-          </a:prstGeom>
-          <a:noFill/>
-        </p:spPr>
-        <p:txBody>
-          <a:bodyPr wrap="none" rtlCol="0">
-            <a:spAutoFit/>
-          </a:bodyPr>
-          <a:lstStyle/>
-          <a:p>
-            <a:r>
-              <a:rPr lang="en-US" smtClean="0"/>
-              <a:t>IOI: </a:t>
-            </a:r>
-            <a:r>
-              <a:rPr lang="en-US" dirty="0" smtClean="0"/>
-              <a:t>Individual Responses</a:t>
-            </a:r>
-            <a:endParaRPr lang="en-US" dirty="0"/>
-          </a:p>
-        </p:txBody>
-      </p:sp>
-    </p:spTree>
-    <p:extLst>
-      <p:ext uri="{BB962C8B-B14F-4D97-AF65-F5344CB8AC3E}">
-        <p14:creationId xmlns:p14="http://schemas.microsoft.com/office/powerpoint/2010/main" val="1839479145"/>
-      </p:ext>
-    </p:extLst>
-  </p:cSld>
-  <p:clrMapOvr>
-    <a:masterClrMapping/>
-  </p:clrMapOvr>
-</p:sld>
-</file>
-
-<file path=ppt/slides/slide12.xml><?xml version="1.0" encoding="utf-8"?>
-<p:sld xmlns:a="http://schemas.openxmlformats.org/drawingml/2006/main" xmlns:r="http://schemas.openxmlformats.org/officeDocument/2006/relationships" xmlns:p="http://schemas.openxmlformats.org/presentationml/2006/main">
-  <p:cSld>
-    <p:spTree>
-      <p:nvGrpSpPr>
-        <p:cNvPr id="1" name=""/>
-        <p:cNvGrpSpPr/>
-        <p:nvPr/>
-      </p:nvGrpSpPr>
-      <p:grpSpPr>
-        <a:xfrm>
-          <a:off x="0" y="0"/>
-          <a:ext cx="0" cy="0"/>
-          <a:chOff x="0" y="0"/>
-          <a:chExt cx="0" cy="0"/>
-        </a:xfrm>
-      </p:grpSpPr>
-      <p:sp>
-        <p:nvSpPr>
-          <p:cNvPr id="2" name="Title 1"/>
-          <p:cNvSpPr>
-            <a:spLocks noGrp="1"/>
-          </p:cNvSpPr>
-          <p:nvPr>
-            <p:ph type="title"/>
-          </p:nvPr>
-        </p:nvSpPr>
-        <p:spPr/>
-        <p:txBody>
-          <a:bodyPr/>
-          <a:lstStyle/>
-          <a:p>
             <a:r>
               <a:rPr lang="en-US" dirty="0" smtClean="0"/>
               <a:t>	Questions:</a:t>
@@ -5368,7 +5116,7 @@
       </p:grpSpPr>
       <p:sp>
         <p:nvSpPr>
-          <p:cNvPr id="4" name="Title 3"/>
+          <p:cNvPr id="2" name="Title 1"/>
           <p:cNvSpPr>
             <a:spLocks noGrp="1"/>
           </p:cNvSpPr>
@@ -5385,9 +5133,28 @@
           </a:p>
         </p:txBody>
       </p:sp>
+      <p:sp>
+        <p:nvSpPr>
+          <p:cNvPr id="3" name="Content Placeholder 2"/>
+          <p:cNvSpPr>
+            <a:spLocks noGrp="1"/>
+          </p:cNvSpPr>
+          <p:nvPr>
+            <p:ph idx="1"/>
+          </p:nvPr>
+        </p:nvSpPr>
+        <p:spPr/>
+        <p:txBody>
+          <a:bodyPr/>
+          <a:lstStyle/>
+          <a:p>
+            <a:endParaRPr lang="en-US"/>
+          </a:p>
+        </p:txBody>
+      </p:sp>
       <p:pic>
         <p:nvPicPr>
-          <p:cNvPr id="7" name="Picture 6"/>
+          <p:cNvPr id="4" name="Picture 3"/>
           <p:cNvPicPr>
             <a:picLocks noChangeAspect="1"/>
           </p:cNvPicPr>
@@ -5401,31 +5168,54 @@
         </p:blipFill>
         <p:spPr>
           <a:xfrm>
-            <a:off x="0" y="465221"/>
-            <a:ext cx="12192000" cy="6553200"/>
+            <a:off x="483315" y="100584"/>
+            <a:ext cx="11225370" cy="6858000"/>
           </a:xfrm>
           <a:prstGeom prst="rect">
             <a:avLst/>
           </a:prstGeom>
         </p:spPr>
       </p:pic>
+      <p:sp>
+        <p:nvSpPr>
+          <p:cNvPr id="5" name="TextBox 4"/>
+          <p:cNvSpPr txBox="1"/>
+          <p:nvPr/>
+        </p:nvSpPr>
+        <p:spPr>
+          <a:xfrm>
+            <a:off x="4639928" y="45522"/>
+            <a:ext cx="2912144" cy="369332"/>
+          </a:xfrm>
+          <a:prstGeom prst="rect">
+            <a:avLst/>
+          </a:prstGeom>
+          <a:noFill/>
+        </p:spPr>
+        <p:txBody>
+          <a:bodyPr wrap="none" rtlCol="0">
+            <a:spAutoFit/>
+          </a:bodyPr>
+          <a:lstStyle/>
+          <a:p>
+            <a:r>
+              <a:rPr lang="en-US" dirty="0" smtClean="0"/>
+              <a:t>SSQ 12: Individual Responses</a:t>
+            </a:r>
+            <a:endParaRPr lang="en-US" dirty="0"/>
+          </a:p>
+        </p:txBody>
+      </p:sp>
     </p:spTree>
     <p:extLst>
       <p:ext uri="{BB962C8B-B14F-4D97-AF65-F5344CB8AC3E}">
-        <p14:creationId xmlns:p14="http://schemas.microsoft.com/office/powerpoint/2010/main" val="1864312755"/>
+        <p14:creationId xmlns:p14="http://schemas.microsoft.com/office/powerpoint/2010/main" val="3907476511"/>
       </p:ext>
     </p:extLst>
   </p:cSld>
   <p:clrMapOvr>
     <a:masterClrMapping/>
   </p:clrMapOvr>
-  <p:timing>
-    <p:tnLst>
-      <p:par>
-        <p:cTn id="1" dur="indefinite" restart="never" nodeType="tmRoot"/>
-      </p:par>
-    </p:tnLst>
-  </p:timing>
 </p:sld>
 </file>
 
@@ -5448,66 +5238,1555 @@
       </p:grpSpPr>
       <p:sp>
         <p:nvSpPr>
-          <p:cNvPr id="2" name="Title 1"/>
-          <p:cNvSpPr>
-            <a:spLocks noGrp="1"/>
-          </p:cNvSpPr>
-          <p:nvPr>
-            <p:ph type="title"/>
-          </p:nvPr>
-        </p:nvSpPr>
-        <p:spPr/>
-        <p:txBody>
-          <a:bodyPr/>
-          <a:lstStyle/>
-          <a:p>
-            <a:endParaRPr lang="en-US"/>
-          </a:p>
-        </p:txBody>
-      </p:sp>
-      <p:pic>
-        <p:nvPicPr>
-          <p:cNvPr id="4" name="Content Placeholder 3"/>
-          <p:cNvPicPr>
-            <a:picLocks noGrp="1" noChangeAspect="1"/>
-          </p:cNvPicPr>
-          <p:nvPr>
-            <p:ph idx="1"/>
-          </p:nvPr>
-        </p:nvPicPr>
-        <p:blipFill>
-          <a:blip r:embed="rId2"/>
-          <a:stretch>
-            <a:fillRect/>
-          </a:stretch>
-        </p:blipFill>
+          <p:cNvPr id="5" name="Rectangle 4"/>
+          <p:cNvSpPr/>
+          <p:nvPr/>
+        </p:nvSpPr>
         <p:spPr>
           <a:xfrm>
-            <a:off x="117441" y="365125"/>
-            <a:ext cx="11818926" cy="6352673"/>
+            <a:off x="551688" y="593038"/>
+            <a:ext cx="6096000" cy="5452775"/>
           </a:xfrm>
           <a:prstGeom prst="rect">
             <a:avLst/>
           </a:prstGeom>
         </p:spPr>
-      </p:pic>
+        <p:txBody>
+          <a:bodyPr>
+            <a:spAutoFit/>
+          </a:bodyPr>
+          <a:lstStyle/>
+          <a:p>
+            <a:pPr latinLnBrk="1">
+              <a:lnSpc>
+                <a:spcPts val="1125"/>
+              </a:lnSpc>
+              <a:tabLst>
+                <a:tab pos="581660" algn="l"/>
+                <a:tab pos="1163320" algn="l"/>
+                <a:tab pos="1744980" algn="l"/>
+                <a:tab pos="2326640" algn="l"/>
+                <a:tab pos="2908300" algn="l"/>
+                <a:tab pos="3489960" algn="l"/>
+                <a:tab pos="4071620" algn="l"/>
+                <a:tab pos="4653280" algn="l"/>
+                <a:tab pos="5234940" algn="l"/>
+                <a:tab pos="5816600" algn="l"/>
+                <a:tab pos="6398260" algn="l"/>
+                <a:tab pos="6979920" algn="l"/>
+                <a:tab pos="7561580" algn="l"/>
+                <a:tab pos="8143240" algn="l"/>
+                <a:tab pos="8724900" algn="l"/>
+                <a:tab pos="9306560" algn="l"/>
+              </a:tabLst>
+            </a:pPr>
+            <a:r>
+              <a:rPr lang="en-US" sz="1200" dirty="0">
+                <a:solidFill>
+                  <a:srgbClr val="000000"/>
+                </a:solidFill>
+                <a:latin typeface="Lucida Console" panose="020B0609040504020204" pitchFamily="49" charset="0"/>
+                <a:ea typeface="Times New Roman" panose="02020603050405020304" pitchFamily="18" charset="0"/>
+                <a:cs typeface="Courier New" panose="02070309020205020404" pitchFamily="49" charset="0"/>
+              </a:rPr>
+              <a:t>lm(formula = </a:t>
+            </a:r>
+            <a:r>
+              <a:rPr lang="en-US" sz="1200" dirty="0" err="1">
+                <a:solidFill>
+                  <a:srgbClr val="000000"/>
+                </a:solidFill>
+                <a:latin typeface="Lucida Console" panose="020B0609040504020204" pitchFamily="49" charset="0"/>
+                <a:ea typeface="Times New Roman" panose="02020603050405020304" pitchFamily="18" charset="0"/>
+                <a:cs typeface="Courier New" panose="02070309020205020404" pitchFamily="49" charset="0"/>
+              </a:rPr>
+              <a:t>alpha_power_peakeo</a:t>
+            </a:r>
+            <a:r>
+              <a:rPr lang="en-US" sz="1200" dirty="0">
+                <a:solidFill>
+                  <a:srgbClr val="000000"/>
+                </a:solidFill>
+                <a:latin typeface="Lucida Console" panose="020B0609040504020204" pitchFamily="49" charset="0"/>
+                <a:ea typeface="Times New Roman" panose="02020603050405020304" pitchFamily="18" charset="0"/>
+                <a:cs typeface="Courier New" panose="02070309020205020404" pitchFamily="49" charset="0"/>
+              </a:rPr>
+              <a:t> ~ ssq12_response_001 + ssq12_response_002 + </a:t>
+            </a:r>
+            <a:endParaRPr lang="en-US" sz="1600" dirty="0">
+              <a:latin typeface="Calibri" panose="020F0502020204030204" pitchFamily="34" charset="0"/>
+              <a:ea typeface="Calibri" panose="020F0502020204030204" pitchFamily="34" charset="0"/>
+              <a:cs typeface="Times New Roman" panose="02020603050405020304" pitchFamily="18" charset="0"/>
+            </a:endParaRPr>
+          </a:p>
+          <a:p>
+            <a:pPr latinLnBrk="1">
+              <a:lnSpc>
+                <a:spcPts val="1125"/>
+              </a:lnSpc>
+              <a:tabLst>
+                <a:tab pos="581660" algn="l"/>
+                <a:tab pos="1163320" algn="l"/>
+                <a:tab pos="1744980" algn="l"/>
+                <a:tab pos="2326640" algn="l"/>
+                <a:tab pos="2908300" algn="l"/>
+                <a:tab pos="3489960" algn="l"/>
+                <a:tab pos="4071620" algn="l"/>
+                <a:tab pos="4653280" algn="l"/>
+                <a:tab pos="5234940" algn="l"/>
+                <a:tab pos="5816600" algn="l"/>
+                <a:tab pos="6398260" algn="l"/>
+                <a:tab pos="6979920" algn="l"/>
+                <a:tab pos="7561580" algn="l"/>
+                <a:tab pos="8143240" algn="l"/>
+                <a:tab pos="8724900" algn="l"/>
+                <a:tab pos="9306560" algn="l"/>
+              </a:tabLst>
+            </a:pPr>
+            <a:r>
+              <a:rPr lang="en-US" sz="1200" dirty="0">
+                <a:solidFill>
+                  <a:srgbClr val="000000"/>
+                </a:solidFill>
+                <a:latin typeface="Lucida Console" panose="020B0609040504020204" pitchFamily="49" charset="0"/>
+                <a:ea typeface="Times New Roman" panose="02020603050405020304" pitchFamily="18" charset="0"/>
+                <a:cs typeface="Courier New" panose="02070309020205020404" pitchFamily="49" charset="0"/>
+              </a:rPr>
+              <a:t>    ssq12_response_003 + ssq12_response_004 + ssq12_response_005 + </a:t>
+            </a:r>
+            <a:endParaRPr lang="en-US" sz="1600" dirty="0">
+              <a:latin typeface="Calibri" panose="020F0502020204030204" pitchFamily="34" charset="0"/>
+              <a:ea typeface="Calibri" panose="020F0502020204030204" pitchFamily="34" charset="0"/>
+              <a:cs typeface="Times New Roman" panose="02020603050405020304" pitchFamily="18" charset="0"/>
+            </a:endParaRPr>
+          </a:p>
+          <a:p>
+            <a:pPr latinLnBrk="1">
+              <a:lnSpc>
+                <a:spcPts val="1125"/>
+              </a:lnSpc>
+              <a:tabLst>
+                <a:tab pos="581660" algn="l"/>
+                <a:tab pos="1163320" algn="l"/>
+                <a:tab pos="1744980" algn="l"/>
+                <a:tab pos="2326640" algn="l"/>
+                <a:tab pos="2908300" algn="l"/>
+                <a:tab pos="3489960" algn="l"/>
+                <a:tab pos="4071620" algn="l"/>
+                <a:tab pos="4653280" algn="l"/>
+                <a:tab pos="5234940" algn="l"/>
+                <a:tab pos="5816600" algn="l"/>
+                <a:tab pos="6398260" algn="l"/>
+                <a:tab pos="6979920" algn="l"/>
+                <a:tab pos="7561580" algn="l"/>
+                <a:tab pos="8143240" algn="l"/>
+                <a:tab pos="8724900" algn="l"/>
+                <a:tab pos="9306560" algn="l"/>
+              </a:tabLst>
+            </a:pPr>
+            <a:r>
+              <a:rPr lang="en-US" sz="1200" dirty="0">
+                <a:solidFill>
+                  <a:srgbClr val="000000"/>
+                </a:solidFill>
+                <a:latin typeface="Lucida Console" panose="020B0609040504020204" pitchFamily="49" charset="0"/>
+                <a:ea typeface="Times New Roman" panose="02020603050405020304" pitchFamily="18" charset="0"/>
+                <a:cs typeface="Courier New" panose="02070309020205020404" pitchFamily="49" charset="0"/>
+              </a:rPr>
+              <a:t>    ssq12_response_006 + ssq12_response_007 + ssq12_response_008 + </a:t>
+            </a:r>
+            <a:endParaRPr lang="en-US" sz="1600" dirty="0">
+              <a:latin typeface="Calibri" panose="020F0502020204030204" pitchFamily="34" charset="0"/>
+              <a:ea typeface="Calibri" panose="020F0502020204030204" pitchFamily="34" charset="0"/>
+              <a:cs typeface="Times New Roman" panose="02020603050405020304" pitchFamily="18" charset="0"/>
+            </a:endParaRPr>
+          </a:p>
+          <a:p>
+            <a:pPr latinLnBrk="1">
+              <a:lnSpc>
+                <a:spcPts val="1125"/>
+              </a:lnSpc>
+              <a:tabLst>
+                <a:tab pos="581660" algn="l"/>
+                <a:tab pos="1163320" algn="l"/>
+                <a:tab pos="1744980" algn="l"/>
+                <a:tab pos="2326640" algn="l"/>
+                <a:tab pos="2908300" algn="l"/>
+                <a:tab pos="3489960" algn="l"/>
+                <a:tab pos="4071620" algn="l"/>
+                <a:tab pos="4653280" algn="l"/>
+                <a:tab pos="5234940" algn="l"/>
+                <a:tab pos="5816600" algn="l"/>
+                <a:tab pos="6398260" algn="l"/>
+                <a:tab pos="6979920" algn="l"/>
+                <a:tab pos="7561580" algn="l"/>
+                <a:tab pos="8143240" algn="l"/>
+                <a:tab pos="8724900" algn="l"/>
+                <a:tab pos="9306560" algn="l"/>
+              </a:tabLst>
+            </a:pPr>
+            <a:r>
+              <a:rPr lang="en-US" sz="1200" dirty="0">
+                <a:solidFill>
+                  <a:srgbClr val="000000"/>
+                </a:solidFill>
+                <a:latin typeface="Lucida Console" panose="020B0609040504020204" pitchFamily="49" charset="0"/>
+                <a:ea typeface="Times New Roman" panose="02020603050405020304" pitchFamily="18" charset="0"/>
+                <a:cs typeface="Courier New" panose="02070309020205020404" pitchFamily="49" charset="0"/>
+              </a:rPr>
+              <a:t>    ssq12_response_009 + ssq12_response_010 + ssq12_response_011 + </a:t>
+            </a:r>
+            <a:endParaRPr lang="en-US" sz="1600" dirty="0">
+              <a:latin typeface="Calibri" panose="020F0502020204030204" pitchFamily="34" charset="0"/>
+              <a:ea typeface="Calibri" panose="020F0502020204030204" pitchFamily="34" charset="0"/>
+              <a:cs typeface="Times New Roman" panose="02020603050405020304" pitchFamily="18" charset="0"/>
+            </a:endParaRPr>
+          </a:p>
+          <a:p>
+            <a:pPr latinLnBrk="1">
+              <a:lnSpc>
+                <a:spcPts val="1125"/>
+              </a:lnSpc>
+              <a:tabLst>
+                <a:tab pos="581660" algn="l"/>
+                <a:tab pos="1163320" algn="l"/>
+                <a:tab pos="1744980" algn="l"/>
+                <a:tab pos="2326640" algn="l"/>
+                <a:tab pos="2908300" algn="l"/>
+                <a:tab pos="3489960" algn="l"/>
+                <a:tab pos="4071620" algn="l"/>
+                <a:tab pos="4653280" algn="l"/>
+                <a:tab pos="5234940" algn="l"/>
+                <a:tab pos="5816600" algn="l"/>
+                <a:tab pos="6398260" algn="l"/>
+                <a:tab pos="6979920" algn="l"/>
+                <a:tab pos="7561580" algn="l"/>
+                <a:tab pos="8143240" algn="l"/>
+                <a:tab pos="8724900" algn="l"/>
+                <a:tab pos="9306560" algn="l"/>
+              </a:tabLst>
+            </a:pPr>
+            <a:r>
+              <a:rPr lang="en-US" sz="1200" dirty="0">
+                <a:solidFill>
+                  <a:srgbClr val="000000"/>
+                </a:solidFill>
+                <a:latin typeface="Lucida Console" panose="020B0609040504020204" pitchFamily="49" charset="0"/>
+                <a:ea typeface="Times New Roman" panose="02020603050405020304" pitchFamily="18" charset="0"/>
+                <a:cs typeface="Courier New" panose="02070309020205020404" pitchFamily="49" charset="0"/>
+              </a:rPr>
+              <a:t>    ssq12_response_012 + ssq12_score, data = </a:t>
+            </a:r>
+            <a:r>
+              <a:rPr lang="en-US" sz="1200" dirty="0" err="1">
+                <a:solidFill>
+                  <a:srgbClr val="000000"/>
+                </a:solidFill>
+                <a:latin typeface="Lucida Console" panose="020B0609040504020204" pitchFamily="49" charset="0"/>
+                <a:ea typeface="Times New Roman" panose="02020603050405020304" pitchFamily="18" charset="0"/>
+                <a:cs typeface="Courier New" panose="02070309020205020404" pitchFamily="49" charset="0"/>
+              </a:rPr>
+              <a:t>all_data</a:t>
+            </a:r>
+            <a:r>
+              <a:rPr lang="en-US" sz="1200" dirty="0">
+                <a:solidFill>
+                  <a:srgbClr val="000000"/>
+                </a:solidFill>
+                <a:latin typeface="Lucida Console" panose="020B0609040504020204" pitchFamily="49" charset="0"/>
+                <a:ea typeface="Times New Roman" panose="02020603050405020304" pitchFamily="18" charset="0"/>
+                <a:cs typeface="Courier New" panose="02070309020205020404" pitchFamily="49" charset="0"/>
+              </a:rPr>
+              <a:t>)</a:t>
+            </a:r>
+            <a:endParaRPr lang="en-US" sz="1600" dirty="0">
+              <a:latin typeface="Calibri" panose="020F0502020204030204" pitchFamily="34" charset="0"/>
+              <a:ea typeface="Calibri" panose="020F0502020204030204" pitchFamily="34" charset="0"/>
+              <a:cs typeface="Times New Roman" panose="02020603050405020304" pitchFamily="18" charset="0"/>
+            </a:endParaRPr>
+          </a:p>
+          <a:p>
+            <a:pPr latinLnBrk="1">
+              <a:lnSpc>
+                <a:spcPts val="1125"/>
+              </a:lnSpc>
+              <a:tabLst>
+                <a:tab pos="581660" algn="l"/>
+                <a:tab pos="1163320" algn="l"/>
+                <a:tab pos="1744980" algn="l"/>
+                <a:tab pos="2326640" algn="l"/>
+                <a:tab pos="2908300" algn="l"/>
+                <a:tab pos="3489960" algn="l"/>
+                <a:tab pos="4071620" algn="l"/>
+                <a:tab pos="4653280" algn="l"/>
+                <a:tab pos="5234940" algn="l"/>
+                <a:tab pos="5816600" algn="l"/>
+                <a:tab pos="6398260" algn="l"/>
+                <a:tab pos="6979920" algn="l"/>
+                <a:tab pos="7561580" algn="l"/>
+                <a:tab pos="8143240" algn="l"/>
+                <a:tab pos="8724900" algn="l"/>
+                <a:tab pos="9306560" algn="l"/>
+              </a:tabLst>
+            </a:pPr>
+            <a:r>
+              <a:rPr lang="en-US" sz="1200" dirty="0">
+                <a:solidFill>
+                  <a:srgbClr val="000000"/>
+                </a:solidFill>
+                <a:latin typeface="Lucida Console" panose="020B0609040504020204" pitchFamily="49" charset="0"/>
+                <a:ea typeface="Times New Roman" panose="02020603050405020304" pitchFamily="18" charset="0"/>
+                <a:cs typeface="Courier New" panose="02070309020205020404" pitchFamily="49" charset="0"/>
+              </a:rPr>
+              <a:t> </a:t>
+            </a:r>
+            <a:endParaRPr lang="en-US" sz="1600" dirty="0">
+              <a:latin typeface="Calibri" panose="020F0502020204030204" pitchFamily="34" charset="0"/>
+              <a:ea typeface="Calibri" panose="020F0502020204030204" pitchFamily="34" charset="0"/>
+              <a:cs typeface="Times New Roman" panose="02020603050405020304" pitchFamily="18" charset="0"/>
+            </a:endParaRPr>
+          </a:p>
+          <a:p>
+            <a:pPr latinLnBrk="1">
+              <a:lnSpc>
+                <a:spcPts val="1125"/>
+              </a:lnSpc>
+              <a:tabLst>
+                <a:tab pos="581660" algn="l"/>
+                <a:tab pos="1163320" algn="l"/>
+                <a:tab pos="1744980" algn="l"/>
+                <a:tab pos="2326640" algn="l"/>
+                <a:tab pos="2908300" algn="l"/>
+                <a:tab pos="3489960" algn="l"/>
+                <a:tab pos="4071620" algn="l"/>
+                <a:tab pos="4653280" algn="l"/>
+                <a:tab pos="5234940" algn="l"/>
+                <a:tab pos="5816600" algn="l"/>
+                <a:tab pos="6398260" algn="l"/>
+                <a:tab pos="6979920" algn="l"/>
+                <a:tab pos="7561580" algn="l"/>
+                <a:tab pos="8143240" algn="l"/>
+                <a:tab pos="8724900" algn="l"/>
+                <a:tab pos="9306560" algn="l"/>
+              </a:tabLst>
+            </a:pPr>
+            <a:r>
+              <a:rPr lang="en-US" sz="1200" dirty="0">
+                <a:solidFill>
+                  <a:srgbClr val="000000"/>
+                </a:solidFill>
+                <a:latin typeface="Lucida Console" panose="020B0609040504020204" pitchFamily="49" charset="0"/>
+                <a:ea typeface="Times New Roman" panose="02020603050405020304" pitchFamily="18" charset="0"/>
+                <a:cs typeface="Courier New" panose="02070309020205020404" pitchFamily="49" charset="0"/>
+              </a:rPr>
+              <a:t>Residuals:</a:t>
+            </a:r>
+            <a:endParaRPr lang="en-US" sz="1600" dirty="0">
+              <a:latin typeface="Calibri" panose="020F0502020204030204" pitchFamily="34" charset="0"/>
+              <a:ea typeface="Calibri" panose="020F0502020204030204" pitchFamily="34" charset="0"/>
+              <a:cs typeface="Times New Roman" panose="02020603050405020304" pitchFamily="18" charset="0"/>
+            </a:endParaRPr>
+          </a:p>
+          <a:p>
+            <a:pPr latinLnBrk="1">
+              <a:lnSpc>
+                <a:spcPts val="1125"/>
+              </a:lnSpc>
+              <a:tabLst>
+                <a:tab pos="581660" algn="l"/>
+                <a:tab pos="1163320" algn="l"/>
+                <a:tab pos="1744980" algn="l"/>
+                <a:tab pos="2326640" algn="l"/>
+                <a:tab pos="2908300" algn="l"/>
+                <a:tab pos="3489960" algn="l"/>
+                <a:tab pos="4071620" algn="l"/>
+                <a:tab pos="4653280" algn="l"/>
+                <a:tab pos="5234940" algn="l"/>
+                <a:tab pos="5816600" algn="l"/>
+                <a:tab pos="6398260" algn="l"/>
+                <a:tab pos="6979920" algn="l"/>
+                <a:tab pos="7561580" algn="l"/>
+                <a:tab pos="8143240" algn="l"/>
+                <a:tab pos="8724900" algn="l"/>
+                <a:tab pos="9306560" algn="l"/>
+              </a:tabLst>
+            </a:pPr>
+            <a:r>
+              <a:rPr lang="en-US" sz="1200" dirty="0">
+                <a:solidFill>
+                  <a:srgbClr val="000000"/>
+                </a:solidFill>
+                <a:latin typeface="Lucida Console" panose="020B0609040504020204" pitchFamily="49" charset="0"/>
+                <a:ea typeface="Times New Roman" panose="02020603050405020304" pitchFamily="18" charset="0"/>
+                <a:cs typeface="Courier New" panose="02070309020205020404" pitchFamily="49" charset="0"/>
+              </a:rPr>
+              <a:t>   Min     1Q Median     3Q    Max </a:t>
+            </a:r>
+            <a:endParaRPr lang="en-US" sz="1600" dirty="0">
+              <a:latin typeface="Calibri" panose="020F0502020204030204" pitchFamily="34" charset="0"/>
+              <a:ea typeface="Calibri" panose="020F0502020204030204" pitchFamily="34" charset="0"/>
+              <a:cs typeface="Times New Roman" panose="02020603050405020304" pitchFamily="18" charset="0"/>
+            </a:endParaRPr>
+          </a:p>
+          <a:p>
+            <a:pPr latinLnBrk="1">
+              <a:lnSpc>
+                <a:spcPts val="1125"/>
+              </a:lnSpc>
+              <a:tabLst>
+                <a:tab pos="581660" algn="l"/>
+                <a:tab pos="1163320" algn="l"/>
+                <a:tab pos="1744980" algn="l"/>
+                <a:tab pos="2326640" algn="l"/>
+                <a:tab pos="2908300" algn="l"/>
+                <a:tab pos="3489960" algn="l"/>
+                <a:tab pos="4071620" algn="l"/>
+                <a:tab pos="4653280" algn="l"/>
+                <a:tab pos="5234940" algn="l"/>
+                <a:tab pos="5816600" algn="l"/>
+                <a:tab pos="6398260" algn="l"/>
+                <a:tab pos="6979920" algn="l"/>
+                <a:tab pos="7561580" algn="l"/>
+                <a:tab pos="8143240" algn="l"/>
+                <a:tab pos="8724900" algn="l"/>
+                <a:tab pos="9306560" algn="l"/>
+              </a:tabLst>
+            </a:pPr>
+            <a:r>
+              <a:rPr lang="en-US" sz="1200" dirty="0">
+                <a:solidFill>
+                  <a:srgbClr val="000000"/>
+                </a:solidFill>
+                <a:latin typeface="Lucida Console" panose="020B0609040504020204" pitchFamily="49" charset="0"/>
+                <a:ea typeface="Times New Roman" panose="02020603050405020304" pitchFamily="18" charset="0"/>
+                <a:cs typeface="Courier New" panose="02070309020205020404" pitchFamily="49" charset="0"/>
+              </a:rPr>
+              <a:t>-4.267 -1.579  0.481  1.103  4.114 </a:t>
+            </a:r>
+            <a:endParaRPr lang="en-US" sz="1600" dirty="0">
+              <a:latin typeface="Calibri" panose="020F0502020204030204" pitchFamily="34" charset="0"/>
+              <a:ea typeface="Calibri" panose="020F0502020204030204" pitchFamily="34" charset="0"/>
+              <a:cs typeface="Times New Roman" panose="02020603050405020304" pitchFamily="18" charset="0"/>
+            </a:endParaRPr>
+          </a:p>
+          <a:p>
+            <a:pPr latinLnBrk="1">
+              <a:lnSpc>
+                <a:spcPts val="1125"/>
+              </a:lnSpc>
+              <a:tabLst>
+                <a:tab pos="581660" algn="l"/>
+                <a:tab pos="1163320" algn="l"/>
+                <a:tab pos="1744980" algn="l"/>
+                <a:tab pos="2326640" algn="l"/>
+                <a:tab pos="2908300" algn="l"/>
+                <a:tab pos="3489960" algn="l"/>
+                <a:tab pos="4071620" algn="l"/>
+                <a:tab pos="4653280" algn="l"/>
+                <a:tab pos="5234940" algn="l"/>
+                <a:tab pos="5816600" algn="l"/>
+                <a:tab pos="6398260" algn="l"/>
+                <a:tab pos="6979920" algn="l"/>
+                <a:tab pos="7561580" algn="l"/>
+                <a:tab pos="8143240" algn="l"/>
+                <a:tab pos="8724900" algn="l"/>
+                <a:tab pos="9306560" algn="l"/>
+              </a:tabLst>
+            </a:pPr>
+            <a:r>
+              <a:rPr lang="en-US" sz="1200" dirty="0">
+                <a:solidFill>
+                  <a:srgbClr val="000000"/>
+                </a:solidFill>
+                <a:latin typeface="Lucida Console" panose="020B0609040504020204" pitchFamily="49" charset="0"/>
+                <a:ea typeface="Times New Roman" panose="02020603050405020304" pitchFamily="18" charset="0"/>
+                <a:cs typeface="Courier New" panose="02070309020205020404" pitchFamily="49" charset="0"/>
+              </a:rPr>
+              <a:t> </a:t>
+            </a:r>
+            <a:endParaRPr lang="en-US" sz="1600" dirty="0">
+              <a:latin typeface="Calibri" panose="020F0502020204030204" pitchFamily="34" charset="0"/>
+              <a:ea typeface="Calibri" panose="020F0502020204030204" pitchFamily="34" charset="0"/>
+              <a:cs typeface="Times New Roman" panose="02020603050405020304" pitchFamily="18" charset="0"/>
+            </a:endParaRPr>
+          </a:p>
+          <a:p>
+            <a:pPr latinLnBrk="1">
+              <a:lnSpc>
+                <a:spcPts val="1125"/>
+              </a:lnSpc>
+              <a:tabLst>
+                <a:tab pos="581660" algn="l"/>
+                <a:tab pos="1163320" algn="l"/>
+                <a:tab pos="1744980" algn="l"/>
+                <a:tab pos="2326640" algn="l"/>
+                <a:tab pos="2908300" algn="l"/>
+                <a:tab pos="3489960" algn="l"/>
+                <a:tab pos="4071620" algn="l"/>
+                <a:tab pos="4653280" algn="l"/>
+                <a:tab pos="5234940" algn="l"/>
+                <a:tab pos="5816600" algn="l"/>
+                <a:tab pos="6398260" algn="l"/>
+                <a:tab pos="6979920" algn="l"/>
+                <a:tab pos="7561580" algn="l"/>
+                <a:tab pos="8143240" algn="l"/>
+                <a:tab pos="8724900" algn="l"/>
+                <a:tab pos="9306560" algn="l"/>
+              </a:tabLst>
+            </a:pPr>
+            <a:r>
+              <a:rPr lang="en-US" sz="1200" dirty="0">
+                <a:solidFill>
+                  <a:srgbClr val="000000"/>
+                </a:solidFill>
+                <a:latin typeface="Lucida Console" panose="020B0609040504020204" pitchFamily="49" charset="0"/>
+                <a:ea typeface="Times New Roman" panose="02020603050405020304" pitchFamily="18" charset="0"/>
+                <a:cs typeface="Courier New" panose="02070309020205020404" pitchFamily="49" charset="0"/>
+              </a:rPr>
+              <a:t>Coefficients: (1 not defined because of singularities)</a:t>
+            </a:r>
+            <a:endParaRPr lang="en-US" sz="1600" dirty="0">
+              <a:latin typeface="Calibri" panose="020F0502020204030204" pitchFamily="34" charset="0"/>
+              <a:ea typeface="Calibri" panose="020F0502020204030204" pitchFamily="34" charset="0"/>
+              <a:cs typeface="Times New Roman" panose="02020603050405020304" pitchFamily="18" charset="0"/>
+            </a:endParaRPr>
+          </a:p>
+          <a:p>
+            <a:pPr latinLnBrk="1">
+              <a:lnSpc>
+                <a:spcPts val="1125"/>
+              </a:lnSpc>
+              <a:tabLst>
+                <a:tab pos="581660" algn="l"/>
+                <a:tab pos="1163320" algn="l"/>
+                <a:tab pos="1744980" algn="l"/>
+                <a:tab pos="2326640" algn="l"/>
+                <a:tab pos="2908300" algn="l"/>
+                <a:tab pos="3489960" algn="l"/>
+                <a:tab pos="4071620" algn="l"/>
+                <a:tab pos="4653280" algn="l"/>
+                <a:tab pos="5234940" algn="l"/>
+                <a:tab pos="5816600" algn="l"/>
+                <a:tab pos="6398260" algn="l"/>
+                <a:tab pos="6979920" algn="l"/>
+                <a:tab pos="7561580" algn="l"/>
+                <a:tab pos="8143240" algn="l"/>
+                <a:tab pos="8724900" algn="l"/>
+                <a:tab pos="9306560" algn="l"/>
+              </a:tabLst>
+            </a:pPr>
+            <a:r>
+              <a:rPr lang="en-US" sz="1200" dirty="0">
+                <a:solidFill>
+                  <a:srgbClr val="000000"/>
+                </a:solidFill>
+                <a:latin typeface="Lucida Console" panose="020B0609040504020204" pitchFamily="49" charset="0"/>
+                <a:ea typeface="Times New Roman" panose="02020603050405020304" pitchFamily="18" charset="0"/>
+                <a:cs typeface="Courier New" panose="02070309020205020404" pitchFamily="49" charset="0"/>
+              </a:rPr>
+              <a:t>                   Estimate Std. Error t value </a:t>
+            </a:r>
+            <a:r>
+              <a:rPr lang="en-US" sz="1200" dirty="0" err="1">
+                <a:solidFill>
+                  <a:srgbClr val="000000"/>
+                </a:solidFill>
+                <a:latin typeface="Lucida Console" panose="020B0609040504020204" pitchFamily="49" charset="0"/>
+                <a:ea typeface="Times New Roman" panose="02020603050405020304" pitchFamily="18" charset="0"/>
+                <a:cs typeface="Courier New" panose="02070309020205020404" pitchFamily="49" charset="0"/>
+              </a:rPr>
+              <a:t>Pr</a:t>
+            </a:r>
+            <a:r>
+              <a:rPr lang="en-US" sz="1200" dirty="0">
+                <a:solidFill>
+                  <a:srgbClr val="000000"/>
+                </a:solidFill>
+                <a:latin typeface="Lucida Console" panose="020B0609040504020204" pitchFamily="49" charset="0"/>
+                <a:ea typeface="Times New Roman" panose="02020603050405020304" pitchFamily="18" charset="0"/>
+                <a:cs typeface="Courier New" panose="02070309020205020404" pitchFamily="49" charset="0"/>
+              </a:rPr>
+              <a:t>(&gt;|t|)   </a:t>
+            </a:r>
+            <a:endParaRPr lang="en-US" sz="1600" dirty="0">
+              <a:latin typeface="Calibri" panose="020F0502020204030204" pitchFamily="34" charset="0"/>
+              <a:ea typeface="Calibri" panose="020F0502020204030204" pitchFamily="34" charset="0"/>
+              <a:cs typeface="Times New Roman" panose="02020603050405020304" pitchFamily="18" charset="0"/>
+            </a:endParaRPr>
+          </a:p>
+          <a:p>
+            <a:pPr latinLnBrk="1">
+              <a:lnSpc>
+                <a:spcPts val="1125"/>
+              </a:lnSpc>
+              <a:tabLst>
+                <a:tab pos="581660" algn="l"/>
+                <a:tab pos="1163320" algn="l"/>
+                <a:tab pos="1744980" algn="l"/>
+                <a:tab pos="2326640" algn="l"/>
+                <a:tab pos="2908300" algn="l"/>
+                <a:tab pos="3489960" algn="l"/>
+                <a:tab pos="4071620" algn="l"/>
+                <a:tab pos="4653280" algn="l"/>
+                <a:tab pos="5234940" algn="l"/>
+                <a:tab pos="5816600" algn="l"/>
+                <a:tab pos="6398260" algn="l"/>
+                <a:tab pos="6979920" algn="l"/>
+                <a:tab pos="7561580" algn="l"/>
+                <a:tab pos="8143240" algn="l"/>
+                <a:tab pos="8724900" algn="l"/>
+                <a:tab pos="9306560" algn="l"/>
+              </a:tabLst>
+            </a:pPr>
+            <a:r>
+              <a:rPr lang="en-US" sz="1200" dirty="0">
+                <a:solidFill>
+                  <a:srgbClr val="000000"/>
+                </a:solidFill>
+                <a:latin typeface="Lucida Console" panose="020B0609040504020204" pitchFamily="49" charset="0"/>
+                <a:ea typeface="Times New Roman" panose="02020603050405020304" pitchFamily="18" charset="0"/>
+                <a:cs typeface="Courier New" panose="02070309020205020404" pitchFamily="49" charset="0"/>
+              </a:rPr>
+              <a:t>(Intercept)         4.01176    3.12918   1.282  0.22222   </a:t>
+            </a:r>
+            <a:endParaRPr lang="en-US" sz="1600" dirty="0">
+              <a:latin typeface="Calibri" panose="020F0502020204030204" pitchFamily="34" charset="0"/>
+              <a:ea typeface="Calibri" panose="020F0502020204030204" pitchFamily="34" charset="0"/>
+              <a:cs typeface="Times New Roman" panose="02020603050405020304" pitchFamily="18" charset="0"/>
+            </a:endParaRPr>
+          </a:p>
+          <a:p>
+            <a:pPr latinLnBrk="1">
+              <a:lnSpc>
+                <a:spcPts val="1125"/>
+              </a:lnSpc>
+              <a:tabLst>
+                <a:tab pos="581660" algn="l"/>
+                <a:tab pos="1163320" algn="l"/>
+                <a:tab pos="1744980" algn="l"/>
+                <a:tab pos="2326640" algn="l"/>
+                <a:tab pos="2908300" algn="l"/>
+                <a:tab pos="3489960" algn="l"/>
+                <a:tab pos="4071620" algn="l"/>
+                <a:tab pos="4653280" algn="l"/>
+                <a:tab pos="5234940" algn="l"/>
+                <a:tab pos="5816600" algn="l"/>
+                <a:tab pos="6398260" algn="l"/>
+                <a:tab pos="6979920" algn="l"/>
+                <a:tab pos="7561580" algn="l"/>
+                <a:tab pos="8143240" algn="l"/>
+                <a:tab pos="8724900" algn="l"/>
+                <a:tab pos="9306560" algn="l"/>
+              </a:tabLst>
+            </a:pPr>
+            <a:r>
+              <a:rPr lang="en-US" sz="1200" dirty="0">
+                <a:solidFill>
+                  <a:srgbClr val="000000"/>
+                </a:solidFill>
+                <a:latin typeface="Lucida Console" panose="020B0609040504020204" pitchFamily="49" charset="0"/>
+                <a:ea typeface="Times New Roman" panose="02020603050405020304" pitchFamily="18" charset="0"/>
+                <a:cs typeface="Courier New" panose="02070309020205020404" pitchFamily="49" charset="0"/>
+              </a:rPr>
+              <a:t>ssq12_response_001 -0.06884    0.05636  -1.221  0.24367   </a:t>
+            </a:r>
+            <a:endParaRPr lang="en-US" sz="1600" dirty="0">
+              <a:latin typeface="Calibri" panose="020F0502020204030204" pitchFamily="34" charset="0"/>
+              <a:ea typeface="Calibri" panose="020F0502020204030204" pitchFamily="34" charset="0"/>
+              <a:cs typeface="Times New Roman" panose="02020603050405020304" pitchFamily="18" charset="0"/>
+            </a:endParaRPr>
+          </a:p>
+          <a:p>
+            <a:pPr latinLnBrk="1">
+              <a:lnSpc>
+                <a:spcPts val="1125"/>
+              </a:lnSpc>
+              <a:tabLst>
+                <a:tab pos="581660" algn="l"/>
+                <a:tab pos="1163320" algn="l"/>
+                <a:tab pos="1744980" algn="l"/>
+                <a:tab pos="2326640" algn="l"/>
+                <a:tab pos="2908300" algn="l"/>
+                <a:tab pos="3489960" algn="l"/>
+                <a:tab pos="4071620" algn="l"/>
+                <a:tab pos="4653280" algn="l"/>
+                <a:tab pos="5234940" algn="l"/>
+                <a:tab pos="5816600" algn="l"/>
+                <a:tab pos="6398260" algn="l"/>
+                <a:tab pos="6979920" algn="l"/>
+                <a:tab pos="7561580" algn="l"/>
+                <a:tab pos="8143240" algn="l"/>
+                <a:tab pos="8724900" algn="l"/>
+                <a:tab pos="9306560" algn="l"/>
+              </a:tabLst>
+            </a:pPr>
+            <a:r>
+              <a:rPr lang="en-US" sz="1200" dirty="0">
+                <a:solidFill>
+                  <a:srgbClr val="000000"/>
+                </a:solidFill>
+                <a:latin typeface="Lucida Console" panose="020B0609040504020204" pitchFamily="49" charset="0"/>
+                <a:ea typeface="Times New Roman" panose="02020603050405020304" pitchFamily="18" charset="0"/>
+                <a:cs typeface="Courier New" panose="02070309020205020404" pitchFamily="49" charset="0"/>
+              </a:rPr>
+              <a:t>ssq12_response_002  0.05261    0.04865   1.082  0.29909   </a:t>
+            </a:r>
+            <a:endParaRPr lang="en-US" sz="1600" dirty="0">
+              <a:latin typeface="Calibri" panose="020F0502020204030204" pitchFamily="34" charset="0"/>
+              <a:ea typeface="Calibri" panose="020F0502020204030204" pitchFamily="34" charset="0"/>
+              <a:cs typeface="Times New Roman" panose="02020603050405020304" pitchFamily="18" charset="0"/>
+            </a:endParaRPr>
+          </a:p>
+          <a:p>
+            <a:pPr latinLnBrk="1">
+              <a:lnSpc>
+                <a:spcPts val="1125"/>
+              </a:lnSpc>
+              <a:tabLst>
+                <a:tab pos="581660" algn="l"/>
+                <a:tab pos="1163320" algn="l"/>
+                <a:tab pos="1744980" algn="l"/>
+                <a:tab pos="2326640" algn="l"/>
+                <a:tab pos="2908300" algn="l"/>
+                <a:tab pos="3489960" algn="l"/>
+                <a:tab pos="4071620" algn="l"/>
+                <a:tab pos="4653280" algn="l"/>
+                <a:tab pos="5234940" algn="l"/>
+                <a:tab pos="5816600" algn="l"/>
+                <a:tab pos="6398260" algn="l"/>
+                <a:tab pos="6979920" algn="l"/>
+                <a:tab pos="7561580" algn="l"/>
+                <a:tab pos="8143240" algn="l"/>
+                <a:tab pos="8724900" algn="l"/>
+                <a:tab pos="9306560" algn="l"/>
+              </a:tabLst>
+            </a:pPr>
+            <a:r>
+              <a:rPr lang="en-US" sz="1200" dirty="0">
+                <a:solidFill>
+                  <a:srgbClr val="000000"/>
+                </a:solidFill>
+                <a:latin typeface="Lucida Console" panose="020B0609040504020204" pitchFamily="49" charset="0"/>
+                <a:ea typeface="Times New Roman" panose="02020603050405020304" pitchFamily="18" charset="0"/>
+                <a:cs typeface="Courier New" panose="02070309020205020404" pitchFamily="49" charset="0"/>
+              </a:rPr>
+              <a:t>ssq12_response_003 -0.12122    0.05493  -2.207  0.04591 * </a:t>
+            </a:r>
+            <a:endParaRPr lang="en-US" sz="1600" dirty="0">
+              <a:latin typeface="Calibri" panose="020F0502020204030204" pitchFamily="34" charset="0"/>
+              <a:ea typeface="Calibri" panose="020F0502020204030204" pitchFamily="34" charset="0"/>
+              <a:cs typeface="Times New Roman" panose="02020603050405020304" pitchFamily="18" charset="0"/>
+            </a:endParaRPr>
+          </a:p>
+          <a:p>
+            <a:pPr latinLnBrk="1">
+              <a:lnSpc>
+                <a:spcPts val="1125"/>
+              </a:lnSpc>
+              <a:tabLst>
+                <a:tab pos="581660" algn="l"/>
+                <a:tab pos="1163320" algn="l"/>
+                <a:tab pos="1744980" algn="l"/>
+                <a:tab pos="2326640" algn="l"/>
+                <a:tab pos="2908300" algn="l"/>
+                <a:tab pos="3489960" algn="l"/>
+                <a:tab pos="4071620" algn="l"/>
+                <a:tab pos="4653280" algn="l"/>
+                <a:tab pos="5234940" algn="l"/>
+                <a:tab pos="5816600" algn="l"/>
+                <a:tab pos="6398260" algn="l"/>
+                <a:tab pos="6979920" algn="l"/>
+                <a:tab pos="7561580" algn="l"/>
+                <a:tab pos="8143240" algn="l"/>
+                <a:tab pos="8724900" algn="l"/>
+                <a:tab pos="9306560" algn="l"/>
+              </a:tabLst>
+            </a:pPr>
+            <a:r>
+              <a:rPr lang="en-US" sz="1200" dirty="0">
+                <a:solidFill>
+                  <a:srgbClr val="000000"/>
+                </a:solidFill>
+                <a:latin typeface="Lucida Console" panose="020B0609040504020204" pitchFamily="49" charset="0"/>
+                <a:ea typeface="Times New Roman" panose="02020603050405020304" pitchFamily="18" charset="0"/>
+                <a:cs typeface="Courier New" panose="02070309020205020404" pitchFamily="49" charset="0"/>
+              </a:rPr>
+              <a:t>ssq12_response_004  0.09130    0.06493   1.406  0.18310   </a:t>
+            </a:r>
+            <a:endParaRPr lang="en-US" sz="1600" dirty="0">
+              <a:latin typeface="Calibri" panose="020F0502020204030204" pitchFamily="34" charset="0"/>
+              <a:ea typeface="Calibri" panose="020F0502020204030204" pitchFamily="34" charset="0"/>
+              <a:cs typeface="Times New Roman" panose="02020603050405020304" pitchFamily="18" charset="0"/>
+            </a:endParaRPr>
+          </a:p>
+          <a:p>
+            <a:pPr latinLnBrk="1">
+              <a:lnSpc>
+                <a:spcPts val="1125"/>
+              </a:lnSpc>
+              <a:tabLst>
+                <a:tab pos="581660" algn="l"/>
+                <a:tab pos="1163320" algn="l"/>
+                <a:tab pos="1744980" algn="l"/>
+                <a:tab pos="2326640" algn="l"/>
+                <a:tab pos="2908300" algn="l"/>
+                <a:tab pos="3489960" algn="l"/>
+                <a:tab pos="4071620" algn="l"/>
+                <a:tab pos="4653280" algn="l"/>
+                <a:tab pos="5234940" algn="l"/>
+                <a:tab pos="5816600" algn="l"/>
+                <a:tab pos="6398260" algn="l"/>
+                <a:tab pos="6979920" algn="l"/>
+                <a:tab pos="7561580" algn="l"/>
+                <a:tab pos="8143240" algn="l"/>
+                <a:tab pos="8724900" algn="l"/>
+                <a:tab pos="9306560" algn="l"/>
+              </a:tabLst>
+            </a:pPr>
+            <a:r>
+              <a:rPr lang="en-US" sz="1200" dirty="0">
+                <a:solidFill>
+                  <a:srgbClr val="000000"/>
+                </a:solidFill>
+                <a:latin typeface="Lucida Console" panose="020B0609040504020204" pitchFamily="49" charset="0"/>
+                <a:ea typeface="Times New Roman" panose="02020603050405020304" pitchFamily="18" charset="0"/>
+                <a:cs typeface="Courier New" panose="02070309020205020404" pitchFamily="49" charset="0"/>
+              </a:rPr>
+              <a:t>ssq12_response_005  0.03365    0.05633   0.597  0.56055   </a:t>
+            </a:r>
+            <a:endParaRPr lang="en-US" sz="1600" dirty="0">
+              <a:latin typeface="Calibri" panose="020F0502020204030204" pitchFamily="34" charset="0"/>
+              <a:ea typeface="Calibri" panose="020F0502020204030204" pitchFamily="34" charset="0"/>
+              <a:cs typeface="Times New Roman" panose="02020603050405020304" pitchFamily="18" charset="0"/>
+            </a:endParaRPr>
+          </a:p>
+          <a:p>
+            <a:pPr latinLnBrk="1">
+              <a:lnSpc>
+                <a:spcPts val="1125"/>
+              </a:lnSpc>
+              <a:tabLst>
+                <a:tab pos="581660" algn="l"/>
+                <a:tab pos="1163320" algn="l"/>
+                <a:tab pos="1744980" algn="l"/>
+                <a:tab pos="2326640" algn="l"/>
+                <a:tab pos="2908300" algn="l"/>
+                <a:tab pos="3489960" algn="l"/>
+                <a:tab pos="4071620" algn="l"/>
+                <a:tab pos="4653280" algn="l"/>
+                <a:tab pos="5234940" algn="l"/>
+                <a:tab pos="5816600" algn="l"/>
+                <a:tab pos="6398260" algn="l"/>
+                <a:tab pos="6979920" algn="l"/>
+                <a:tab pos="7561580" algn="l"/>
+                <a:tab pos="8143240" algn="l"/>
+                <a:tab pos="8724900" algn="l"/>
+                <a:tab pos="9306560" algn="l"/>
+              </a:tabLst>
+            </a:pPr>
+            <a:r>
+              <a:rPr lang="en-US" sz="1200" dirty="0">
+                <a:solidFill>
+                  <a:srgbClr val="000000"/>
+                </a:solidFill>
+                <a:latin typeface="Lucida Console" panose="020B0609040504020204" pitchFamily="49" charset="0"/>
+                <a:ea typeface="Times New Roman" panose="02020603050405020304" pitchFamily="18" charset="0"/>
+                <a:cs typeface="Courier New" panose="02070309020205020404" pitchFamily="49" charset="0"/>
+              </a:rPr>
+              <a:t>ssq12_response_006  0.02033    0.05568   0.365  0.72084   </a:t>
+            </a:r>
+            <a:endParaRPr lang="en-US" sz="1600" dirty="0">
+              <a:latin typeface="Calibri" panose="020F0502020204030204" pitchFamily="34" charset="0"/>
+              <a:ea typeface="Calibri" panose="020F0502020204030204" pitchFamily="34" charset="0"/>
+              <a:cs typeface="Times New Roman" panose="02020603050405020304" pitchFamily="18" charset="0"/>
+            </a:endParaRPr>
+          </a:p>
+          <a:p>
+            <a:pPr latinLnBrk="1">
+              <a:lnSpc>
+                <a:spcPts val="1125"/>
+              </a:lnSpc>
+              <a:tabLst>
+                <a:tab pos="581660" algn="l"/>
+                <a:tab pos="1163320" algn="l"/>
+                <a:tab pos="1744980" algn="l"/>
+                <a:tab pos="2326640" algn="l"/>
+                <a:tab pos="2908300" algn="l"/>
+                <a:tab pos="3489960" algn="l"/>
+                <a:tab pos="4071620" algn="l"/>
+                <a:tab pos="4653280" algn="l"/>
+                <a:tab pos="5234940" algn="l"/>
+                <a:tab pos="5816600" algn="l"/>
+                <a:tab pos="6398260" algn="l"/>
+                <a:tab pos="6979920" algn="l"/>
+                <a:tab pos="7561580" algn="l"/>
+                <a:tab pos="8143240" algn="l"/>
+                <a:tab pos="8724900" algn="l"/>
+                <a:tab pos="9306560" algn="l"/>
+              </a:tabLst>
+            </a:pPr>
+            <a:r>
+              <a:rPr lang="en-US" sz="1200" dirty="0">
+                <a:solidFill>
+                  <a:srgbClr val="000000"/>
+                </a:solidFill>
+                <a:latin typeface="Lucida Console" panose="020B0609040504020204" pitchFamily="49" charset="0"/>
+                <a:ea typeface="Times New Roman" panose="02020603050405020304" pitchFamily="18" charset="0"/>
+                <a:cs typeface="Courier New" panose="02070309020205020404" pitchFamily="49" charset="0"/>
+              </a:rPr>
+              <a:t>ssq12_response_007  0.09809    0.05311   1.847  0.08763 . </a:t>
+            </a:r>
+            <a:endParaRPr lang="en-US" sz="1600" dirty="0">
+              <a:latin typeface="Calibri" panose="020F0502020204030204" pitchFamily="34" charset="0"/>
+              <a:ea typeface="Calibri" panose="020F0502020204030204" pitchFamily="34" charset="0"/>
+              <a:cs typeface="Times New Roman" panose="02020603050405020304" pitchFamily="18" charset="0"/>
+            </a:endParaRPr>
+          </a:p>
+          <a:p>
+            <a:pPr latinLnBrk="1">
+              <a:lnSpc>
+                <a:spcPts val="1125"/>
+              </a:lnSpc>
+              <a:tabLst>
+                <a:tab pos="581660" algn="l"/>
+                <a:tab pos="1163320" algn="l"/>
+                <a:tab pos="1744980" algn="l"/>
+                <a:tab pos="2326640" algn="l"/>
+                <a:tab pos="2908300" algn="l"/>
+                <a:tab pos="3489960" algn="l"/>
+                <a:tab pos="4071620" algn="l"/>
+                <a:tab pos="4653280" algn="l"/>
+                <a:tab pos="5234940" algn="l"/>
+                <a:tab pos="5816600" algn="l"/>
+                <a:tab pos="6398260" algn="l"/>
+                <a:tab pos="6979920" algn="l"/>
+                <a:tab pos="7561580" algn="l"/>
+                <a:tab pos="8143240" algn="l"/>
+                <a:tab pos="8724900" algn="l"/>
+                <a:tab pos="9306560" algn="l"/>
+              </a:tabLst>
+            </a:pPr>
+            <a:r>
+              <a:rPr lang="en-US" sz="1200" dirty="0">
+                <a:solidFill>
+                  <a:srgbClr val="000000"/>
+                </a:solidFill>
+                <a:latin typeface="Lucida Console" panose="020B0609040504020204" pitchFamily="49" charset="0"/>
+                <a:ea typeface="Times New Roman" panose="02020603050405020304" pitchFamily="18" charset="0"/>
+                <a:cs typeface="Courier New" panose="02070309020205020404" pitchFamily="49" charset="0"/>
+              </a:rPr>
+              <a:t>ssq12_response_008 -0.16605    0.04444  -3.736  0.00249 **</a:t>
+            </a:r>
+            <a:endParaRPr lang="en-US" sz="1600" dirty="0">
+              <a:latin typeface="Calibri" panose="020F0502020204030204" pitchFamily="34" charset="0"/>
+              <a:ea typeface="Calibri" panose="020F0502020204030204" pitchFamily="34" charset="0"/>
+              <a:cs typeface="Times New Roman" panose="02020603050405020304" pitchFamily="18" charset="0"/>
+            </a:endParaRPr>
+          </a:p>
+          <a:p>
+            <a:pPr latinLnBrk="1">
+              <a:lnSpc>
+                <a:spcPts val="1125"/>
+              </a:lnSpc>
+              <a:tabLst>
+                <a:tab pos="581660" algn="l"/>
+                <a:tab pos="1163320" algn="l"/>
+                <a:tab pos="1744980" algn="l"/>
+                <a:tab pos="2326640" algn="l"/>
+                <a:tab pos="2908300" algn="l"/>
+                <a:tab pos="3489960" algn="l"/>
+                <a:tab pos="4071620" algn="l"/>
+                <a:tab pos="4653280" algn="l"/>
+                <a:tab pos="5234940" algn="l"/>
+                <a:tab pos="5816600" algn="l"/>
+                <a:tab pos="6398260" algn="l"/>
+                <a:tab pos="6979920" algn="l"/>
+                <a:tab pos="7561580" algn="l"/>
+                <a:tab pos="8143240" algn="l"/>
+                <a:tab pos="8724900" algn="l"/>
+                <a:tab pos="9306560" algn="l"/>
+              </a:tabLst>
+            </a:pPr>
+            <a:r>
+              <a:rPr lang="en-US" sz="1200" dirty="0">
+                <a:solidFill>
+                  <a:srgbClr val="000000"/>
+                </a:solidFill>
+                <a:latin typeface="Lucida Console" panose="020B0609040504020204" pitchFamily="49" charset="0"/>
+                <a:ea typeface="Times New Roman" panose="02020603050405020304" pitchFamily="18" charset="0"/>
+                <a:cs typeface="Courier New" panose="02070309020205020404" pitchFamily="49" charset="0"/>
+              </a:rPr>
+              <a:t>ssq12_response_009  0.01210    0.03178   0.381  0.70954   </a:t>
+            </a:r>
+            <a:endParaRPr lang="en-US" sz="1600" dirty="0">
+              <a:latin typeface="Calibri" panose="020F0502020204030204" pitchFamily="34" charset="0"/>
+              <a:ea typeface="Calibri" panose="020F0502020204030204" pitchFamily="34" charset="0"/>
+              <a:cs typeface="Times New Roman" panose="02020603050405020304" pitchFamily="18" charset="0"/>
+            </a:endParaRPr>
+          </a:p>
+          <a:p>
+            <a:pPr latinLnBrk="1">
+              <a:lnSpc>
+                <a:spcPts val="1125"/>
+              </a:lnSpc>
+              <a:tabLst>
+                <a:tab pos="581660" algn="l"/>
+                <a:tab pos="1163320" algn="l"/>
+                <a:tab pos="1744980" algn="l"/>
+                <a:tab pos="2326640" algn="l"/>
+                <a:tab pos="2908300" algn="l"/>
+                <a:tab pos="3489960" algn="l"/>
+                <a:tab pos="4071620" algn="l"/>
+                <a:tab pos="4653280" algn="l"/>
+                <a:tab pos="5234940" algn="l"/>
+                <a:tab pos="5816600" algn="l"/>
+                <a:tab pos="6398260" algn="l"/>
+                <a:tab pos="6979920" algn="l"/>
+                <a:tab pos="7561580" algn="l"/>
+                <a:tab pos="8143240" algn="l"/>
+                <a:tab pos="8724900" algn="l"/>
+                <a:tab pos="9306560" algn="l"/>
+              </a:tabLst>
+            </a:pPr>
+            <a:r>
+              <a:rPr lang="en-US" sz="1200" dirty="0">
+                <a:solidFill>
+                  <a:srgbClr val="000000"/>
+                </a:solidFill>
+                <a:latin typeface="Lucida Console" panose="020B0609040504020204" pitchFamily="49" charset="0"/>
+                <a:ea typeface="Times New Roman" panose="02020603050405020304" pitchFamily="18" charset="0"/>
+                <a:cs typeface="Courier New" panose="02070309020205020404" pitchFamily="49" charset="0"/>
+              </a:rPr>
+              <a:t>ssq12_response_010 -0.06275    0.03215  -1.952  0.07288 . </a:t>
+            </a:r>
+            <a:endParaRPr lang="en-US" sz="1600" dirty="0">
+              <a:latin typeface="Calibri" panose="020F0502020204030204" pitchFamily="34" charset="0"/>
+              <a:ea typeface="Calibri" panose="020F0502020204030204" pitchFamily="34" charset="0"/>
+              <a:cs typeface="Times New Roman" panose="02020603050405020304" pitchFamily="18" charset="0"/>
+            </a:endParaRPr>
+          </a:p>
+          <a:p>
+            <a:pPr latinLnBrk="1">
+              <a:lnSpc>
+                <a:spcPts val="1125"/>
+              </a:lnSpc>
+              <a:tabLst>
+                <a:tab pos="581660" algn="l"/>
+                <a:tab pos="1163320" algn="l"/>
+                <a:tab pos="1744980" algn="l"/>
+                <a:tab pos="2326640" algn="l"/>
+                <a:tab pos="2908300" algn="l"/>
+                <a:tab pos="3489960" algn="l"/>
+                <a:tab pos="4071620" algn="l"/>
+                <a:tab pos="4653280" algn="l"/>
+                <a:tab pos="5234940" algn="l"/>
+                <a:tab pos="5816600" algn="l"/>
+                <a:tab pos="6398260" algn="l"/>
+                <a:tab pos="6979920" algn="l"/>
+                <a:tab pos="7561580" algn="l"/>
+                <a:tab pos="8143240" algn="l"/>
+                <a:tab pos="8724900" algn="l"/>
+                <a:tab pos="9306560" algn="l"/>
+              </a:tabLst>
+            </a:pPr>
+            <a:r>
+              <a:rPr lang="en-US" sz="1200" dirty="0">
+                <a:solidFill>
+                  <a:srgbClr val="000000"/>
+                </a:solidFill>
+                <a:latin typeface="Lucida Console" panose="020B0609040504020204" pitchFamily="49" charset="0"/>
+                <a:ea typeface="Times New Roman" panose="02020603050405020304" pitchFamily="18" charset="0"/>
+                <a:cs typeface="Courier New" panose="02070309020205020404" pitchFamily="49" charset="0"/>
+              </a:rPr>
+              <a:t>ssq12_response_011  0.10243    0.05134   1.995  0.06741 . </a:t>
+            </a:r>
+            <a:endParaRPr lang="en-US" sz="1600" dirty="0">
+              <a:latin typeface="Calibri" panose="020F0502020204030204" pitchFamily="34" charset="0"/>
+              <a:ea typeface="Calibri" panose="020F0502020204030204" pitchFamily="34" charset="0"/>
+              <a:cs typeface="Times New Roman" panose="02020603050405020304" pitchFamily="18" charset="0"/>
+            </a:endParaRPr>
+          </a:p>
+          <a:p>
+            <a:pPr latinLnBrk="1">
+              <a:lnSpc>
+                <a:spcPts val="1125"/>
+              </a:lnSpc>
+              <a:tabLst>
+                <a:tab pos="581660" algn="l"/>
+                <a:tab pos="1163320" algn="l"/>
+                <a:tab pos="1744980" algn="l"/>
+                <a:tab pos="2326640" algn="l"/>
+                <a:tab pos="2908300" algn="l"/>
+                <a:tab pos="3489960" algn="l"/>
+                <a:tab pos="4071620" algn="l"/>
+                <a:tab pos="4653280" algn="l"/>
+                <a:tab pos="5234940" algn="l"/>
+                <a:tab pos="5816600" algn="l"/>
+                <a:tab pos="6398260" algn="l"/>
+                <a:tab pos="6979920" algn="l"/>
+                <a:tab pos="7561580" algn="l"/>
+                <a:tab pos="8143240" algn="l"/>
+                <a:tab pos="8724900" algn="l"/>
+                <a:tab pos="9306560" algn="l"/>
+              </a:tabLst>
+            </a:pPr>
+            <a:r>
+              <a:rPr lang="en-US" sz="1200" dirty="0">
+                <a:solidFill>
+                  <a:srgbClr val="000000"/>
+                </a:solidFill>
+                <a:latin typeface="Lucida Console" panose="020B0609040504020204" pitchFamily="49" charset="0"/>
+                <a:ea typeface="Times New Roman" panose="02020603050405020304" pitchFamily="18" charset="0"/>
+                <a:cs typeface="Courier New" panose="02070309020205020404" pitchFamily="49" charset="0"/>
+              </a:rPr>
+              <a:t>ssq12_response_012  0.04819    0.04335   1.112  0.28639   </a:t>
+            </a:r>
+            <a:endParaRPr lang="en-US" sz="1600" dirty="0">
+              <a:latin typeface="Calibri" panose="020F0502020204030204" pitchFamily="34" charset="0"/>
+              <a:ea typeface="Calibri" panose="020F0502020204030204" pitchFamily="34" charset="0"/>
+              <a:cs typeface="Times New Roman" panose="02020603050405020304" pitchFamily="18" charset="0"/>
+            </a:endParaRPr>
+          </a:p>
+          <a:p>
+            <a:pPr latinLnBrk="1">
+              <a:lnSpc>
+                <a:spcPts val="1125"/>
+              </a:lnSpc>
+              <a:tabLst>
+                <a:tab pos="581660" algn="l"/>
+                <a:tab pos="1163320" algn="l"/>
+                <a:tab pos="1744980" algn="l"/>
+                <a:tab pos="2326640" algn="l"/>
+                <a:tab pos="2908300" algn="l"/>
+                <a:tab pos="3489960" algn="l"/>
+                <a:tab pos="4071620" algn="l"/>
+                <a:tab pos="4653280" algn="l"/>
+                <a:tab pos="5234940" algn="l"/>
+                <a:tab pos="5816600" algn="l"/>
+                <a:tab pos="6398260" algn="l"/>
+                <a:tab pos="6979920" algn="l"/>
+                <a:tab pos="7561580" algn="l"/>
+                <a:tab pos="8143240" algn="l"/>
+                <a:tab pos="8724900" algn="l"/>
+                <a:tab pos="9306560" algn="l"/>
+              </a:tabLst>
+            </a:pPr>
+            <a:r>
+              <a:rPr lang="en-US" sz="1200" dirty="0">
+                <a:solidFill>
+                  <a:srgbClr val="000000"/>
+                </a:solidFill>
+                <a:latin typeface="Lucida Console" panose="020B0609040504020204" pitchFamily="49" charset="0"/>
+                <a:ea typeface="Times New Roman" panose="02020603050405020304" pitchFamily="18" charset="0"/>
+                <a:cs typeface="Courier New" panose="02070309020205020404" pitchFamily="49" charset="0"/>
+              </a:rPr>
+              <a:t>ssq12_score              NA         </a:t>
+            </a:r>
+            <a:r>
+              <a:rPr lang="en-US" sz="1200" dirty="0" err="1">
+                <a:solidFill>
+                  <a:srgbClr val="000000"/>
+                </a:solidFill>
+                <a:latin typeface="Lucida Console" panose="020B0609040504020204" pitchFamily="49" charset="0"/>
+                <a:ea typeface="Times New Roman" panose="02020603050405020304" pitchFamily="18" charset="0"/>
+                <a:cs typeface="Courier New" panose="02070309020205020404" pitchFamily="49" charset="0"/>
+              </a:rPr>
+              <a:t>NA</a:t>
+            </a:r>
+            <a:r>
+              <a:rPr lang="en-US" sz="1200" dirty="0">
+                <a:solidFill>
+                  <a:srgbClr val="000000"/>
+                </a:solidFill>
+                <a:latin typeface="Lucida Console" panose="020B0609040504020204" pitchFamily="49" charset="0"/>
+                <a:ea typeface="Times New Roman" panose="02020603050405020304" pitchFamily="18" charset="0"/>
+                <a:cs typeface="Courier New" panose="02070309020205020404" pitchFamily="49" charset="0"/>
+              </a:rPr>
+              <a:t>      </a:t>
+            </a:r>
+            <a:r>
+              <a:rPr lang="en-US" sz="1200" dirty="0" err="1">
+                <a:solidFill>
+                  <a:srgbClr val="000000"/>
+                </a:solidFill>
+                <a:latin typeface="Lucida Console" panose="020B0609040504020204" pitchFamily="49" charset="0"/>
+                <a:ea typeface="Times New Roman" panose="02020603050405020304" pitchFamily="18" charset="0"/>
+                <a:cs typeface="Courier New" panose="02070309020205020404" pitchFamily="49" charset="0"/>
+              </a:rPr>
+              <a:t>NA</a:t>
+            </a:r>
+            <a:r>
+              <a:rPr lang="en-US" sz="1200" dirty="0">
+                <a:solidFill>
+                  <a:srgbClr val="000000"/>
+                </a:solidFill>
+                <a:latin typeface="Lucida Console" panose="020B0609040504020204" pitchFamily="49" charset="0"/>
+                <a:ea typeface="Times New Roman" panose="02020603050405020304" pitchFamily="18" charset="0"/>
+                <a:cs typeface="Courier New" panose="02070309020205020404" pitchFamily="49" charset="0"/>
+              </a:rPr>
+              <a:t>       </a:t>
+            </a:r>
+            <a:r>
+              <a:rPr lang="en-US" sz="1200" dirty="0" err="1">
+                <a:solidFill>
+                  <a:srgbClr val="000000"/>
+                </a:solidFill>
+                <a:latin typeface="Lucida Console" panose="020B0609040504020204" pitchFamily="49" charset="0"/>
+                <a:ea typeface="Times New Roman" panose="02020603050405020304" pitchFamily="18" charset="0"/>
+                <a:cs typeface="Courier New" panose="02070309020205020404" pitchFamily="49" charset="0"/>
+              </a:rPr>
+              <a:t>NA</a:t>
+            </a:r>
+            <a:r>
+              <a:rPr lang="en-US" sz="1200" dirty="0">
+                <a:solidFill>
+                  <a:srgbClr val="000000"/>
+                </a:solidFill>
+                <a:latin typeface="Lucida Console" panose="020B0609040504020204" pitchFamily="49" charset="0"/>
+                <a:ea typeface="Times New Roman" panose="02020603050405020304" pitchFamily="18" charset="0"/>
+                <a:cs typeface="Courier New" panose="02070309020205020404" pitchFamily="49" charset="0"/>
+              </a:rPr>
+              <a:t>   </a:t>
+            </a:r>
+            <a:endParaRPr lang="en-US" sz="1600" dirty="0">
+              <a:latin typeface="Calibri" panose="020F0502020204030204" pitchFamily="34" charset="0"/>
+              <a:ea typeface="Calibri" panose="020F0502020204030204" pitchFamily="34" charset="0"/>
+              <a:cs typeface="Times New Roman" panose="02020603050405020304" pitchFamily="18" charset="0"/>
+            </a:endParaRPr>
+          </a:p>
+          <a:p>
+            <a:pPr latinLnBrk="1">
+              <a:lnSpc>
+                <a:spcPts val="1125"/>
+              </a:lnSpc>
+              <a:tabLst>
+                <a:tab pos="581660" algn="l"/>
+                <a:tab pos="1163320" algn="l"/>
+                <a:tab pos="1744980" algn="l"/>
+                <a:tab pos="2326640" algn="l"/>
+                <a:tab pos="2908300" algn="l"/>
+                <a:tab pos="3489960" algn="l"/>
+                <a:tab pos="4071620" algn="l"/>
+                <a:tab pos="4653280" algn="l"/>
+                <a:tab pos="5234940" algn="l"/>
+                <a:tab pos="5816600" algn="l"/>
+                <a:tab pos="6398260" algn="l"/>
+                <a:tab pos="6979920" algn="l"/>
+                <a:tab pos="7561580" algn="l"/>
+                <a:tab pos="8143240" algn="l"/>
+                <a:tab pos="8724900" algn="l"/>
+                <a:tab pos="9306560" algn="l"/>
+              </a:tabLst>
+            </a:pPr>
+            <a:r>
+              <a:rPr lang="en-US" sz="1200" dirty="0">
+                <a:solidFill>
+                  <a:srgbClr val="000000"/>
+                </a:solidFill>
+                <a:latin typeface="Lucida Console" panose="020B0609040504020204" pitchFamily="49" charset="0"/>
+                <a:ea typeface="Times New Roman" panose="02020603050405020304" pitchFamily="18" charset="0"/>
+                <a:cs typeface="Courier New" panose="02070309020205020404" pitchFamily="49" charset="0"/>
+              </a:rPr>
+              <a:t>---</a:t>
+            </a:r>
+            <a:endParaRPr lang="en-US" sz="1600" dirty="0">
+              <a:latin typeface="Calibri" panose="020F0502020204030204" pitchFamily="34" charset="0"/>
+              <a:ea typeface="Calibri" panose="020F0502020204030204" pitchFamily="34" charset="0"/>
+              <a:cs typeface="Times New Roman" panose="02020603050405020304" pitchFamily="18" charset="0"/>
+            </a:endParaRPr>
+          </a:p>
+          <a:p>
+            <a:pPr latinLnBrk="1">
+              <a:lnSpc>
+                <a:spcPts val="1125"/>
+              </a:lnSpc>
+              <a:tabLst>
+                <a:tab pos="581660" algn="l"/>
+                <a:tab pos="1163320" algn="l"/>
+                <a:tab pos="1744980" algn="l"/>
+                <a:tab pos="2326640" algn="l"/>
+                <a:tab pos="2908300" algn="l"/>
+                <a:tab pos="3489960" algn="l"/>
+                <a:tab pos="4071620" algn="l"/>
+                <a:tab pos="4653280" algn="l"/>
+                <a:tab pos="5234940" algn="l"/>
+                <a:tab pos="5816600" algn="l"/>
+                <a:tab pos="6398260" algn="l"/>
+                <a:tab pos="6979920" algn="l"/>
+                <a:tab pos="7561580" algn="l"/>
+                <a:tab pos="8143240" algn="l"/>
+                <a:tab pos="8724900" algn="l"/>
+                <a:tab pos="9306560" algn="l"/>
+              </a:tabLst>
+            </a:pPr>
+            <a:r>
+              <a:rPr lang="en-US" sz="1200" dirty="0" err="1">
+                <a:solidFill>
+                  <a:srgbClr val="000000"/>
+                </a:solidFill>
+                <a:latin typeface="Lucida Console" panose="020B0609040504020204" pitchFamily="49" charset="0"/>
+                <a:ea typeface="Times New Roman" panose="02020603050405020304" pitchFamily="18" charset="0"/>
+                <a:cs typeface="Courier New" panose="02070309020205020404" pitchFamily="49" charset="0"/>
+              </a:rPr>
+              <a:t>Signif</a:t>
+            </a:r>
+            <a:r>
+              <a:rPr lang="en-US" sz="1200" dirty="0">
+                <a:solidFill>
+                  <a:srgbClr val="000000"/>
+                </a:solidFill>
+                <a:latin typeface="Lucida Console" panose="020B0609040504020204" pitchFamily="49" charset="0"/>
+                <a:ea typeface="Times New Roman" panose="02020603050405020304" pitchFamily="18" charset="0"/>
+                <a:cs typeface="Courier New" panose="02070309020205020404" pitchFamily="49" charset="0"/>
+              </a:rPr>
+              <a:t>. codes:  0 ‘***’ 0.001 ‘**’ 0.01 ‘*’ 0.05 ‘.’ 0.1 ‘ ’ 1</a:t>
+            </a:r>
+            <a:endParaRPr lang="en-US" sz="1600" dirty="0">
+              <a:latin typeface="Calibri" panose="020F0502020204030204" pitchFamily="34" charset="0"/>
+              <a:ea typeface="Calibri" panose="020F0502020204030204" pitchFamily="34" charset="0"/>
+              <a:cs typeface="Times New Roman" panose="02020603050405020304" pitchFamily="18" charset="0"/>
+            </a:endParaRPr>
+          </a:p>
+          <a:p>
+            <a:pPr latinLnBrk="1">
+              <a:lnSpc>
+                <a:spcPts val="1125"/>
+              </a:lnSpc>
+              <a:tabLst>
+                <a:tab pos="581660" algn="l"/>
+                <a:tab pos="1163320" algn="l"/>
+                <a:tab pos="1744980" algn="l"/>
+                <a:tab pos="2326640" algn="l"/>
+                <a:tab pos="2908300" algn="l"/>
+                <a:tab pos="3489960" algn="l"/>
+                <a:tab pos="4071620" algn="l"/>
+                <a:tab pos="4653280" algn="l"/>
+                <a:tab pos="5234940" algn="l"/>
+                <a:tab pos="5816600" algn="l"/>
+                <a:tab pos="6398260" algn="l"/>
+                <a:tab pos="6979920" algn="l"/>
+                <a:tab pos="7561580" algn="l"/>
+                <a:tab pos="8143240" algn="l"/>
+                <a:tab pos="8724900" algn="l"/>
+                <a:tab pos="9306560" algn="l"/>
+              </a:tabLst>
+            </a:pPr>
+            <a:r>
+              <a:rPr lang="en-US" sz="1200" dirty="0">
+                <a:solidFill>
+                  <a:srgbClr val="000000"/>
+                </a:solidFill>
+                <a:latin typeface="Lucida Console" panose="020B0609040504020204" pitchFamily="49" charset="0"/>
+                <a:ea typeface="Times New Roman" panose="02020603050405020304" pitchFamily="18" charset="0"/>
+                <a:cs typeface="Courier New" panose="02070309020205020404" pitchFamily="49" charset="0"/>
+              </a:rPr>
+              <a:t> </a:t>
+            </a:r>
+            <a:endParaRPr lang="en-US" sz="1600" dirty="0">
+              <a:latin typeface="Calibri" panose="020F0502020204030204" pitchFamily="34" charset="0"/>
+              <a:ea typeface="Calibri" panose="020F0502020204030204" pitchFamily="34" charset="0"/>
+              <a:cs typeface="Times New Roman" panose="02020603050405020304" pitchFamily="18" charset="0"/>
+            </a:endParaRPr>
+          </a:p>
+          <a:p>
+            <a:pPr latinLnBrk="1">
+              <a:lnSpc>
+                <a:spcPts val="1125"/>
+              </a:lnSpc>
+              <a:tabLst>
+                <a:tab pos="581660" algn="l"/>
+                <a:tab pos="1163320" algn="l"/>
+                <a:tab pos="1744980" algn="l"/>
+                <a:tab pos="2326640" algn="l"/>
+                <a:tab pos="2908300" algn="l"/>
+                <a:tab pos="3489960" algn="l"/>
+                <a:tab pos="4071620" algn="l"/>
+                <a:tab pos="4653280" algn="l"/>
+                <a:tab pos="5234940" algn="l"/>
+                <a:tab pos="5816600" algn="l"/>
+                <a:tab pos="6398260" algn="l"/>
+                <a:tab pos="6979920" algn="l"/>
+                <a:tab pos="7561580" algn="l"/>
+                <a:tab pos="8143240" algn="l"/>
+                <a:tab pos="8724900" algn="l"/>
+                <a:tab pos="9306560" algn="l"/>
+              </a:tabLst>
+            </a:pPr>
+            <a:r>
+              <a:rPr lang="en-US" sz="1200" dirty="0">
+                <a:solidFill>
+                  <a:srgbClr val="000000"/>
+                </a:solidFill>
+                <a:latin typeface="Lucida Console" panose="020B0609040504020204" pitchFamily="49" charset="0"/>
+                <a:ea typeface="Times New Roman" panose="02020603050405020304" pitchFamily="18" charset="0"/>
+                <a:cs typeface="Courier New" panose="02070309020205020404" pitchFamily="49" charset="0"/>
+              </a:rPr>
+              <a:t>Residual standard error: 3.094 on 13 degrees of freedom</a:t>
+            </a:r>
+            <a:endParaRPr lang="en-US" sz="1600" dirty="0">
+              <a:latin typeface="Calibri" panose="020F0502020204030204" pitchFamily="34" charset="0"/>
+              <a:ea typeface="Calibri" panose="020F0502020204030204" pitchFamily="34" charset="0"/>
+              <a:cs typeface="Times New Roman" panose="02020603050405020304" pitchFamily="18" charset="0"/>
+            </a:endParaRPr>
+          </a:p>
+          <a:p>
+            <a:pPr latinLnBrk="1">
+              <a:lnSpc>
+                <a:spcPts val="1125"/>
+              </a:lnSpc>
+              <a:tabLst>
+                <a:tab pos="581660" algn="l"/>
+                <a:tab pos="1163320" algn="l"/>
+                <a:tab pos="1744980" algn="l"/>
+                <a:tab pos="2326640" algn="l"/>
+                <a:tab pos="2908300" algn="l"/>
+                <a:tab pos="3489960" algn="l"/>
+                <a:tab pos="4071620" algn="l"/>
+                <a:tab pos="4653280" algn="l"/>
+                <a:tab pos="5234940" algn="l"/>
+                <a:tab pos="5816600" algn="l"/>
+                <a:tab pos="6398260" algn="l"/>
+                <a:tab pos="6979920" algn="l"/>
+                <a:tab pos="7561580" algn="l"/>
+                <a:tab pos="8143240" algn="l"/>
+                <a:tab pos="8724900" algn="l"/>
+                <a:tab pos="9306560" algn="l"/>
+              </a:tabLst>
+            </a:pPr>
+            <a:r>
+              <a:rPr lang="en-US" sz="1200" dirty="0">
+                <a:solidFill>
+                  <a:srgbClr val="000000"/>
+                </a:solidFill>
+                <a:latin typeface="Lucida Console" panose="020B0609040504020204" pitchFamily="49" charset="0"/>
+                <a:ea typeface="Times New Roman" panose="02020603050405020304" pitchFamily="18" charset="0"/>
+                <a:cs typeface="Courier New" panose="02070309020205020404" pitchFamily="49" charset="0"/>
+              </a:rPr>
+              <a:t>  (2 observations deleted due to </a:t>
+            </a:r>
+            <a:r>
+              <a:rPr lang="en-US" sz="1200" dirty="0" err="1">
+                <a:solidFill>
+                  <a:srgbClr val="000000"/>
+                </a:solidFill>
+                <a:latin typeface="Lucida Console" panose="020B0609040504020204" pitchFamily="49" charset="0"/>
+                <a:ea typeface="Times New Roman" panose="02020603050405020304" pitchFamily="18" charset="0"/>
+                <a:cs typeface="Courier New" panose="02070309020205020404" pitchFamily="49" charset="0"/>
+              </a:rPr>
+              <a:t>missingness</a:t>
+            </a:r>
+            <a:r>
+              <a:rPr lang="en-US" sz="1200" dirty="0">
+                <a:solidFill>
+                  <a:srgbClr val="000000"/>
+                </a:solidFill>
+                <a:latin typeface="Lucida Console" panose="020B0609040504020204" pitchFamily="49" charset="0"/>
+                <a:ea typeface="Times New Roman" panose="02020603050405020304" pitchFamily="18" charset="0"/>
+                <a:cs typeface="Courier New" panose="02070309020205020404" pitchFamily="49" charset="0"/>
+              </a:rPr>
+              <a:t>)</a:t>
+            </a:r>
+            <a:endParaRPr lang="en-US" sz="1600" dirty="0">
+              <a:latin typeface="Calibri" panose="020F0502020204030204" pitchFamily="34" charset="0"/>
+              <a:ea typeface="Calibri" panose="020F0502020204030204" pitchFamily="34" charset="0"/>
+              <a:cs typeface="Times New Roman" panose="02020603050405020304" pitchFamily="18" charset="0"/>
+            </a:endParaRPr>
+          </a:p>
+          <a:p>
+            <a:pPr latinLnBrk="1">
+              <a:lnSpc>
+                <a:spcPts val="1125"/>
+              </a:lnSpc>
+              <a:tabLst>
+                <a:tab pos="581660" algn="l"/>
+                <a:tab pos="1163320" algn="l"/>
+                <a:tab pos="1744980" algn="l"/>
+                <a:tab pos="2326640" algn="l"/>
+                <a:tab pos="2908300" algn="l"/>
+                <a:tab pos="3489960" algn="l"/>
+                <a:tab pos="4071620" algn="l"/>
+                <a:tab pos="4653280" algn="l"/>
+                <a:tab pos="5234940" algn="l"/>
+                <a:tab pos="5816600" algn="l"/>
+                <a:tab pos="6398260" algn="l"/>
+                <a:tab pos="6979920" algn="l"/>
+                <a:tab pos="7561580" algn="l"/>
+                <a:tab pos="8143240" algn="l"/>
+                <a:tab pos="8724900" algn="l"/>
+                <a:tab pos="9306560" algn="l"/>
+              </a:tabLst>
+            </a:pPr>
+            <a:r>
+              <a:rPr lang="en-US" sz="1200" dirty="0">
+                <a:solidFill>
+                  <a:srgbClr val="000000"/>
+                </a:solidFill>
+                <a:latin typeface="Lucida Console" panose="020B0609040504020204" pitchFamily="49" charset="0"/>
+                <a:ea typeface="Times New Roman" panose="02020603050405020304" pitchFamily="18" charset="0"/>
+                <a:cs typeface="Courier New" panose="02070309020205020404" pitchFamily="49" charset="0"/>
+              </a:rPr>
+              <a:t>Multiple R-squared:  0.6359,	Adjusted R-squared:  0.2998 </a:t>
+            </a:r>
+            <a:endParaRPr lang="en-US" sz="1600" dirty="0">
+              <a:latin typeface="Calibri" panose="020F0502020204030204" pitchFamily="34" charset="0"/>
+              <a:ea typeface="Calibri" panose="020F0502020204030204" pitchFamily="34" charset="0"/>
+              <a:cs typeface="Times New Roman" panose="02020603050405020304" pitchFamily="18" charset="0"/>
+            </a:endParaRPr>
+          </a:p>
+          <a:p>
+            <a:pPr latinLnBrk="1">
+              <a:lnSpc>
+                <a:spcPts val="1125"/>
+              </a:lnSpc>
+              <a:tabLst>
+                <a:tab pos="581660" algn="l"/>
+                <a:tab pos="1163320" algn="l"/>
+                <a:tab pos="1744980" algn="l"/>
+                <a:tab pos="2326640" algn="l"/>
+                <a:tab pos="2908300" algn="l"/>
+                <a:tab pos="3489960" algn="l"/>
+                <a:tab pos="4071620" algn="l"/>
+                <a:tab pos="4653280" algn="l"/>
+                <a:tab pos="5234940" algn="l"/>
+                <a:tab pos="5816600" algn="l"/>
+                <a:tab pos="6398260" algn="l"/>
+                <a:tab pos="6979920" algn="l"/>
+                <a:tab pos="7561580" algn="l"/>
+                <a:tab pos="8143240" algn="l"/>
+                <a:tab pos="8724900" algn="l"/>
+                <a:tab pos="9306560" algn="l"/>
+              </a:tabLst>
+            </a:pPr>
+            <a:r>
+              <a:rPr lang="en-US" sz="1200" dirty="0">
+                <a:solidFill>
+                  <a:srgbClr val="000000"/>
+                </a:solidFill>
+                <a:latin typeface="Lucida Console" panose="020B0609040504020204" pitchFamily="49" charset="0"/>
+                <a:ea typeface="Times New Roman" panose="02020603050405020304" pitchFamily="18" charset="0"/>
+                <a:cs typeface="Courier New" panose="02070309020205020404" pitchFamily="49" charset="0"/>
+              </a:rPr>
+              <a:t>F-statistic: 1.892 on 12 and 13 DF,  p-value: 0.1341</a:t>
+            </a:r>
+            <a:endParaRPr lang="en-US" sz="1600" dirty="0">
+              <a:effectLst/>
+              <a:latin typeface="Calibri" panose="020F0502020204030204" pitchFamily="34" charset="0"/>
+              <a:ea typeface="Calibri" panose="020F0502020204030204" pitchFamily="34" charset="0"/>
+              <a:cs typeface="Times New Roman" panose="02020603050405020304" pitchFamily="18" charset="0"/>
+            </a:endParaRPr>
+          </a:p>
+        </p:txBody>
+      </p:sp>
     </p:spTree>
     <p:extLst>
       <p:ext uri="{BB962C8B-B14F-4D97-AF65-F5344CB8AC3E}">
-        <p14:creationId xmlns:p14="http://schemas.microsoft.com/office/powerpoint/2010/main" val="1273148078"/>
+        <p14:creationId xmlns:p14="http://schemas.microsoft.com/office/powerpoint/2010/main" val="4125323499"/>
       </p:ext>
     </p:extLst>
   </p:cSld>
   <p:clrMapOvr>
     <a:masterClrMapping/>
   </p:clrMapOvr>
-  <p:timing>
-    <p:tnLst>
-      <p:par>
-        <p:cTn id="1" dur="indefinite" restart="never" nodeType="tmRoot"/>
-      </p:par>
-    </p:tnLst>
-  </p:timing>
 </p:sld>
 </file>
 
@@ -5538,36 +6817,12 @@
             <p:ph type="title"/>
           </p:nvPr>
         </p:nvSpPr>
-        <p:spPr>
-          <a:xfrm>
-            <a:off x="838200" y="-341397"/>
-            <a:ext cx="10515600" cy="1325563"/>
-          </a:xfrm>
-        </p:spPr>
-        <p:txBody>
-          <a:bodyPr>
-            <a:normAutofit/>
-          </a:bodyPr>
+        <p:spPr/>
+        <p:txBody>
+          <a:bodyPr/>
           <a:lstStyle/>
           <a:p>
-            <a:pPr algn="ctr"/>
-            <a:r>
-              <a:rPr lang="en-US" sz="3200" dirty="0" err="1" smtClean="0"/>
-              <a:t>Audiobility</a:t>
-            </a:r>
-            <a:r>
-              <a:rPr lang="en-US" sz="3200" dirty="0" smtClean="0"/>
-              <a:t> between 25 and 40 </a:t>
-            </a:r>
-            <a:r>
-              <a:rPr lang="en-US" sz="3200" dirty="0" err="1" smtClean="0"/>
-              <a:t>db</a:t>
-            </a:r>
-            <a:r>
-              <a:rPr lang="en-US" sz="3200" dirty="0" smtClean="0"/>
-              <a:t> HL</a:t>
-            </a:r>
-            <a:endParaRPr lang="en-US" sz="3200" dirty="0"/>
+            <a:endParaRPr lang="en-US"/>
           </a:p>
         </p:txBody>
       </p:sp>
@@ -5606,31 +6861,58 @@
         </p:blipFill>
         <p:spPr>
           <a:xfrm>
-            <a:off x="0" y="513348"/>
-            <a:ext cx="12192000" cy="6553200"/>
+            <a:off x="483315" y="109728"/>
+            <a:ext cx="11225370" cy="6858000"/>
           </a:xfrm>
           <a:prstGeom prst="rect">
             <a:avLst/>
           </a:prstGeom>
         </p:spPr>
       </p:pic>
+      <p:sp>
+        <p:nvSpPr>
+          <p:cNvPr id="5" name="TextBox 4"/>
+          <p:cNvSpPr txBox="1"/>
+          <p:nvPr/>
+        </p:nvSpPr>
+        <p:spPr>
+          <a:xfrm>
+            <a:off x="4639928" y="45522"/>
+            <a:ext cx="2525820" cy="369332"/>
+          </a:xfrm>
+          <a:prstGeom prst="rect">
+            <a:avLst/>
+          </a:prstGeom>
+          <a:noFill/>
+        </p:spPr>
+        <p:txBody>
+          <a:bodyPr wrap="none" rtlCol="0">
+            <a:spAutoFit/>
+          </a:bodyPr>
+          <a:lstStyle/>
+          <a:p>
+            <a:r>
+              <a:rPr lang="en-US" smtClean="0"/>
+              <a:t>IOI: </a:t>
+            </a:r>
+            <a:r>
+              <a:rPr lang="en-US" dirty="0" smtClean="0"/>
+              <a:t>Individual Responses</a:t>
+            </a:r>
+            <a:endParaRPr lang="en-US" dirty="0"/>
+          </a:p>
+        </p:txBody>
+      </p:sp>
     </p:spTree>
     <p:extLst>
       <p:ext uri="{BB962C8B-B14F-4D97-AF65-F5344CB8AC3E}">
-        <p14:creationId xmlns:p14="http://schemas.microsoft.com/office/powerpoint/2010/main" val="2503059545"/>
+        <p14:creationId xmlns:p14="http://schemas.microsoft.com/office/powerpoint/2010/main" val="1839479145"/>
       </p:ext>
     </p:extLst>
   </p:cSld>
   <p:clrMapOvr>
     <a:masterClrMapping/>
   </p:clrMapOvr>
-  <p:timing>
-    <p:tnLst>
-      <p:par>
-        <p:cTn id="1" dur="indefinite" restart="never" nodeType="tmRoot"/>
-      </p:par>
-    </p:tnLst>
-  </p:timing>
 </p:sld>
 </file>
 
@@ -5653,123 +6935,887 @@
       </p:grpSpPr>
       <p:sp>
         <p:nvSpPr>
-          <p:cNvPr id="2" name="Title 1"/>
-          <p:cNvSpPr>
-            <a:spLocks noGrp="1"/>
-          </p:cNvSpPr>
-          <p:nvPr>
-            <p:ph type="title"/>
-          </p:nvPr>
-        </p:nvSpPr>
-        <p:spPr/>
-        <p:txBody>
-          <a:bodyPr/>
-          <a:lstStyle/>
-          <a:p>
-            <a:endParaRPr lang="en-US"/>
-          </a:p>
-        </p:txBody>
-      </p:sp>
-      <p:sp>
-        <p:nvSpPr>
-          <p:cNvPr id="3" name="Content Placeholder 2"/>
-          <p:cNvSpPr>
-            <a:spLocks noGrp="1"/>
-          </p:cNvSpPr>
-          <p:nvPr>
-            <p:ph idx="1"/>
-          </p:nvPr>
-        </p:nvSpPr>
-        <p:spPr/>
-        <p:txBody>
-          <a:bodyPr/>
-          <a:lstStyle/>
-          <a:p>
-            <a:endParaRPr lang="en-US"/>
-          </a:p>
-        </p:txBody>
-      </p:sp>
-      <p:pic>
-        <p:nvPicPr>
-          <p:cNvPr id="4" name="Picture 3"/>
-          <p:cNvPicPr>
-            <a:picLocks noChangeAspect="1"/>
-          </p:cNvPicPr>
+          <p:cNvPr id="9" name="Rectangle 6"/>
+          <p:cNvSpPr>
+            <a:spLocks noChangeArrowheads="1"/>
+          </p:cNvSpPr>
           <p:nvPr/>
-        </p:nvPicPr>
-        <p:blipFill>
-          <a:blip r:embed="rId2"/>
-          <a:stretch>
-            <a:fillRect/>
-          </a:stretch>
-        </p:blipFill>
-        <p:spPr>
+        </p:nvSpPr>
+        <p:spPr bwMode="auto">
           <a:xfrm>
-            <a:off x="0" y="296778"/>
-            <a:ext cx="12192000" cy="6553200"/>
+            <a:off x="0" y="1555689"/>
+            <a:ext cx="9482328" cy="3231654"/>
           </a:xfrm>
           <a:prstGeom prst="rect">
             <a:avLst/>
           </a:prstGeom>
+          <a:solidFill>
+            <a:srgbClr val="FFFFFF"/>
+          </a:solidFill>
+          <a:ln>
+            <a:noFill/>
+          </a:ln>
+          <a:effectLst/>
+          <a:extLst>
+            <a:ext uri="{91240B29-F687-4F45-9708-019B960494DF}">
+              <a14:hiddenLine xmlns:a14="http://schemas.microsoft.com/office/drawing/2010/main" w="9525">
+                <a:solidFill>
+                  <a:schemeClr val="tx1"/>
+                </a:solidFill>
+                <a:miter lim="800000"/>
+                <a:headEnd/>
+                <a:tailEnd/>
+              </a14:hiddenLine>
+            </a:ext>
+            <a:ext uri="{AF507438-7753-43E0-B8FC-AC1667EBCBE1}">
+              <a14:hiddenEffects xmlns:a14="http://schemas.microsoft.com/office/drawing/2010/main">
+                <a:effectLst>
+                  <a:outerShdw dist="35921" dir="2700000" algn="ctr" rotWithShape="0">
+                    <a:schemeClr val="bg2"/>
+                  </a:outerShdw>
+                </a:effectLst>
+              </a14:hiddenEffects>
+            </a:ext>
+          </a:extLst>
         </p:spPr>
-      </p:pic>
-      <p:sp>
-        <p:nvSpPr>
-          <p:cNvPr id="5" name="Rectangle 4"/>
-          <p:cNvSpPr/>
-          <p:nvPr/>
-        </p:nvSpPr>
-        <p:spPr>
-          <a:xfrm>
-            <a:off x="4270051" y="-4207"/>
-            <a:ext cx="3651897" cy="369332"/>
-          </a:xfrm>
-          <a:prstGeom prst="rect">
-            <a:avLst/>
-          </a:prstGeom>
-        </p:spPr>
-        <p:txBody>
-          <a:bodyPr wrap="none">
+        <p:txBody>
+          <a:bodyPr vert="horz" wrap="square" lIns="0" tIns="0" rIns="0" bIns="0" numCol="1" anchor="ctr" anchorCtr="0" compatLnSpc="1">
+            <a:prstTxWarp prst="textNoShape">
+              <a:avLst/>
+            </a:prstTxWarp>
             <a:spAutoFit/>
           </a:bodyPr>
           <a:lstStyle/>
           <a:p>
-            <a:r>
-              <a:rPr lang="en-US" dirty="0" err="1"/>
-              <a:t>Audiobility</a:t>
-            </a:r>
-            <a:r>
-              <a:rPr lang="en-US" dirty="0"/>
-              <a:t> between 25 and 40 </a:t>
-            </a:r>
-            <a:r>
-              <a:rPr lang="en-US" dirty="0" err="1"/>
-              <a:t>db</a:t>
-            </a:r>
-            <a:r>
-              <a:rPr lang="en-US" dirty="0"/>
-              <a:t> HL</a:t>
-            </a:r>
+            <a:pPr marL="0" marR="0" lvl="0" indent="0" algn="l" defTabSz="914400" rtl="0" eaLnBrk="0" fontAlgn="base" latinLnBrk="0" hangingPunct="0">
+              <a:lnSpc>
+                <a:spcPct val="100000"/>
+              </a:lnSpc>
+              <a:spcBef>
+                <a:spcPct val="0"/>
+              </a:spcBef>
+              <a:spcAft>
+                <a:spcPct val="0"/>
+              </a:spcAft>
+              <a:buClrTx/>
+              <a:buSzTx/>
+              <a:buFontTx/>
+              <a:buNone/>
+              <a:tabLst/>
+            </a:pPr>
+            <a:r>
+              <a:rPr kumimoji="0" lang="en-US" altLang="en-US" sz="1000" b="0" i="0" u="none" strike="noStrike" cap="none" normalizeH="0" baseline="0" dirty="0" smtClean="0">
+                <a:ln>
+                  <a:noFill/>
+                </a:ln>
+                <a:solidFill>
+                  <a:srgbClr val="000000"/>
+                </a:solidFill>
+                <a:effectLst/>
+                <a:latin typeface="Lucida Console" panose="020B0609040504020204" pitchFamily="49" charset="0"/>
+                <a:ea typeface="Times New Roman" panose="02020603050405020304" pitchFamily="18" charset="0"/>
+                <a:cs typeface="Courier New" panose="02070309020205020404" pitchFamily="49" charset="0"/>
+              </a:rPr>
+              <a:t>lm(formula = </a:t>
+            </a:r>
+            <a:r>
+              <a:rPr kumimoji="0" lang="en-US" altLang="en-US" sz="1000" b="0" i="0" u="none" strike="noStrike" cap="none" normalizeH="0" baseline="0" dirty="0" err="1" smtClean="0">
+                <a:ln>
+                  <a:noFill/>
+                </a:ln>
+                <a:solidFill>
+                  <a:srgbClr val="000000"/>
+                </a:solidFill>
+                <a:effectLst/>
+                <a:latin typeface="Lucida Console" panose="020B0609040504020204" pitchFamily="49" charset="0"/>
+                <a:ea typeface="Times New Roman" panose="02020603050405020304" pitchFamily="18" charset="0"/>
+                <a:cs typeface="Courier New" panose="02070309020205020404" pitchFamily="49" charset="0"/>
+              </a:rPr>
+              <a:t>alpha_power_peak_ratio</a:t>
+            </a:r>
+            <a:r>
+              <a:rPr kumimoji="0" lang="en-US" altLang="en-US" sz="1000" b="0" i="0" u="none" strike="noStrike" cap="none" normalizeH="0" baseline="0" dirty="0" smtClean="0">
+                <a:ln>
+                  <a:noFill/>
+                </a:ln>
+                <a:solidFill>
+                  <a:srgbClr val="000000"/>
+                </a:solidFill>
+                <a:effectLst/>
+                <a:latin typeface="Lucida Console" panose="020B0609040504020204" pitchFamily="49" charset="0"/>
+                <a:ea typeface="Times New Roman" panose="02020603050405020304" pitchFamily="18" charset="0"/>
+                <a:cs typeface="Courier New" panose="02070309020205020404" pitchFamily="49" charset="0"/>
+              </a:rPr>
+              <a:t> ~ ioiha_response_001 + ioiha_response_002 +     ioiha_response_003 + ioiha_response_004 + ioiha_response_005 +     ioiha_response_006 + ioiha_response_007, data = </a:t>
+            </a:r>
+            <a:r>
+              <a:rPr kumimoji="0" lang="en-US" altLang="en-US" sz="1000" b="0" i="0" u="none" strike="noStrike" cap="none" normalizeH="0" baseline="0" dirty="0" err="1" smtClean="0">
+                <a:ln>
+                  <a:noFill/>
+                </a:ln>
+                <a:solidFill>
+                  <a:srgbClr val="000000"/>
+                </a:solidFill>
+                <a:effectLst/>
+                <a:latin typeface="Lucida Console" panose="020B0609040504020204" pitchFamily="49" charset="0"/>
+                <a:ea typeface="Times New Roman" panose="02020603050405020304" pitchFamily="18" charset="0"/>
+                <a:cs typeface="Courier New" panose="02070309020205020404" pitchFamily="49" charset="0"/>
+              </a:rPr>
+              <a:t>all_data</a:t>
+            </a:r>
+            <a:r>
+              <a:rPr kumimoji="0" lang="en-US" altLang="en-US" sz="1000" b="0" i="0" u="none" strike="noStrike" cap="none" normalizeH="0" baseline="0" dirty="0" smtClean="0">
+                <a:ln>
+                  <a:noFill/>
+                </a:ln>
+                <a:solidFill>
+                  <a:srgbClr val="000000"/>
+                </a:solidFill>
+                <a:effectLst/>
+                <a:latin typeface="Lucida Console" panose="020B0609040504020204" pitchFamily="49" charset="0"/>
+                <a:ea typeface="Times New Roman" panose="02020603050405020304" pitchFamily="18" charset="0"/>
+                <a:cs typeface="Courier New" panose="02070309020205020404" pitchFamily="49" charset="0"/>
+              </a:rPr>
+              <a:t>)</a:t>
+            </a:r>
+          </a:p>
+          <a:p>
+            <a:pPr marL="0" marR="0" lvl="0" indent="0" algn="l" defTabSz="914400" rtl="0" eaLnBrk="0" fontAlgn="base" latinLnBrk="0" hangingPunct="0">
+              <a:lnSpc>
+                <a:spcPct val="100000"/>
+              </a:lnSpc>
+              <a:spcBef>
+                <a:spcPct val="0"/>
+              </a:spcBef>
+              <a:spcAft>
+                <a:spcPct val="0"/>
+              </a:spcAft>
+              <a:buClrTx/>
+              <a:buSzTx/>
+              <a:buFontTx/>
+              <a:buNone/>
+              <a:tabLst/>
+            </a:pPr>
+            <a:endParaRPr lang="en-US" altLang="en-US" sz="1000" dirty="0">
+              <a:solidFill>
+                <a:srgbClr val="000000"/>
+              </a:solidFill>
+              <a:latin typeface="Lucida Console" panose="020B0609040504020204" pitchFamily="49" charset="0"/>
+              <a:ea typeface="Times New Roman" panose="02020603050405020304" pitchFamily="18" charset="0"/>
+              <a:cs typeface="Courier New" panose="02070309020205020404" pitchFamily="49" charset="0"/>
+            </a:endParaRPr>
+          </a:p>
+          <a:p>
+            <a:pPr marL="0" marR="0" lvl="0" indent="0" algn="l" defTabSz="914400" rtl="0" eaLnBrk="0" fontAlgn="base" latinLnBrk="0" hangingPunct="0">
+              <a:lnSpc>
+                <a:spcPct val="100000"/>
+              </a:lnSpc>
+              <a:spcBef>
+                <a:spcPct val="0"/>
+              </a:spcBef>
+              <a:spcAft>
+                <a:spcPct val="0"/>
+              </a:spcAft>
+              <a:buClrTx/>
+              <a:buSzTx/>
+              <a:buFontTx/>
+              <a:buNone/>
+              <a:tabLst/>
+            </a:pPr>
+            <a:r>
+              <a:rPr kumimoji="0" lang="en-US" altLang="en-US" sz="1000" b="0" i="0" u="none" strike="noStrike" cap="none" normalizeH="0" baseline="0" smtClean="0">
+                <a:ln>
+                  <a:noFill/>
+                </a:ln>
+                <a:solidFill>
+                  <a:srgbClr val="000000"/>
+                </a:solidFill>
+                <a:effectLst/>
+                <a:latin typeface="Lucida Console" panose="020B0609040504020204" pitchFamily="49" charset="0"/>
+                <a:ea typeface="Times New Roman" panose="02020603050405020304" pitchFamily="18" charset="0"/>
+                <a:cs typeface="Courier New" panose="02070309020205020404" pitchFamily="49" charset="0"/>
+              </a:rPr>
+              <a:t>Residuals</a:t>
+            </a:r>
+            <a:r>
+              <a:rPr kumimoji="0" lang="en-US" altLang="en-US" sz="1000" b="0" i="0" u="none" strike="noStrike" cap="none" normalizeH="0" baseline="0" dirty="0" smtClean="0">
+                <a:ln>
+                  <a:noFill/>
+                </a:ln>
+                <a:solidFill>
+                  <a:srgbClr val="000000"/>
+                </a:solidFill>
+                <a:effectLst/>
+                <a:latin typeface="Lucida Console" panose="020B0609040504020204" pitchFamily="49" charset="0"/>
+                <a:ea typeface="Times New Roman" panose="02020603050405020304" pitchFamily="18" charset="0"/>
+                <a:cs typeface="Courier New" panose="02070309020205020404" pitchFamily="49" charset="0"/>
+              </a:rPr>
+              <a:t>:     Min       1Q   Median       3Q      Max </a:t>
+            </a:r>
+          </a:p>
+          <a:p>
+            <a:pPr marL="0" marR="0" lvl="0" indent="0" algn="l" defTabSz="914400" rtl="0" eaLnBrk="0" fontAlgn="base" latinLnBrk="0" hangingPunct="0">
+              <a:lnSpc>
+                <a:spcPct val="100000"/>
+              </a:lnSpc>
+              <a:spcBef>
+                <a:spcPct val="0"/>
+              </a:spcBef>
+              <a:spcAft>
+                <a:spcPct val="0"/>
+              </a:spcAft>
+              <a:buClrTx/>
+              <a:buSzTx/>
+              <a:buFontTx/>
+              <a:buNone/>
+              <a:tabLst/>
+            </a:pPr>
+            <a:r>
+              <a:rPr kumimoji="0" lang="en-US" altLang="en-US" sz="1000" b="0" i="0" u="none" strike="noStrike" cap="none" normalizeH="0" baseline="0" dirty="0" smtClean="0">
+                <a:ln>
+                  <a:noFill/>
+                </a:ln>
+                <a:solidFill>
+                  <a:srgbClr val="000000"/>
+                </a:solidFill>
+                <a:effectLst/>
+                <a:latin typeface="Lucida Console" panose="020B0609040504020204" pitchFamily="49" charset="0"/>
+                <a:ea typeface="Times New Roman" panose="02020603050405020304" pitchFamily="18" charset="0"/>
+                <a:cs typeface="Courier New" panose="02070309020205020404" pitchFamily="49" charset="0"/>
+              </a:rPr>
+              <a:t>	-0.36982 -0.10673 -0.05996  0.11369  0.44908 </a:t>
+            </a:r>
+          </a:p>
+          <a:p>
+            <a:pPr marL="0" marR="0" lvl="0" indent="0" algn="l" defTabSz="914400" rtl="0" eaLnBrk="0" fontAlgn="base" latinLnBrk="0" hangingPunct="0">
+              <a:lnSpc>
+                <a:spcPct val="100000"/>
+              </a:lnSpc>
+              <a:spcBef>
+                <a:spcPct val="0"/>
+              </a:spcBef>
+              <a:spcAft>
+                <a:spcPct val="0"/>
+              </a:spcAft>
+              <a:buClrTx/>
+              <a:buSzTx/>
+              <a:buFontTx/>
+              <a:buNone/>
+              <a:tabLst/>
+            </a:pPr>
+            <a:r>
+              <a:rPr kumimoji="0" lang="en-US" altLang="en-US" sz="1000" b="0" i="0" u="none" strike="noStrike" cap="none" normalizeH="0" baseline="0" dirty="0" smtClean="0">
+                <a:ln>
+                  <a:noFill/>
+                </a:ln>
+                <a:solidFill>
+                  <a:srgbClr val="000000"/>
+                </a:solidFill>
+                <a:effectLst/>
+                <a:latin typeface="Lucida Console" panose="020B0609040504020204" pitchFamily="49" charset="0"/>
+                <a:ea typeface="Times New Roman" panose="02020603050405020304" pitchFamily="18" charset="0"/>
+                <a:cs typeface="Courier New" panose="02070309020205020404" pitchFamily="49" charset="0"/>
+              </a:rPr>
+              <a:t>Coefficients:        </a:t>
+            </a:r>
+          </a:p>
+          <a:p>
+            <a:pPr marL="0" marR="0" lvl="0" indent="0" algn="l" defTabSz="914400" rtl="0" eaLnBrk="0" fontAlgn="base" latinLnBrk="0" hangingPunct="0">
+              <a:lnSpc>
+                <a:spcPct val="100000"/>
+              </a:lnSpc>
+              <a:spcBef>
+                <a:spcPct val="0"/>
+              </a:spcBef>
+              <a:spcAft>
+                <a:spcPct val="0"/>
+              </a:spcAft>
+              <a:buClrTx/>
+              <a:buSzTx/>
+              <a:buFontTx/>
+              <a:buNone/>
+              <a:tabLst/>
+            </a:pPr>
+            <a:r>
+              <a:rPr kumimoji="0" lang="en-US" altLang="en-US" sz="1000" b="0" i="0" u="none" strike="noStrike" cap="none" normalizeH="0" baseline="0" dirty="0" smtClean="0">
+                <a:ln>
+                  <a:noFill/>
+                </a:ln>
+                <a:solidFill>
+                  <a:srgbClr val="000000"/>
+                </a:solidFill>
+                <a:effectLst/>
+                <a:latin typeface="Lucida Console" panose="020B0609040504020204" pitchFamily="49" charset="0"/>
+                <a:ea typeface="Times New Roman" panose="02020603050405020304" pitchFamily="18" charset="0"/>
+                <a:cs typeface="Courier New" panose="02070309020205020404" pitchFamily="49" charset="0"/>
+              </a:rPr>
+              <a:t>           Estimate Std. Error t value </a:t>
+            </a:r>
+            <a:r>
+              <a:rPr kumimoji="0" lang="en-US" altLang="en-US" sz="1000" b="0" i="0" u="none" strike="noStrike" cap="none" normalizeH="0" baseline="0" dirty="0" err="1" smtClean="0">
+                <a:ln>
+                  <a:noFill/>
+                </a:ln>
+                <a:solidFill>
+                  <a:srgbClr val="000000"/>
+                </a:solidFill>
+                <a:effectLst/>
+                <a:latin typeface="Lucida Console" panose="020B0609040504020204" pitchFamily="49" charset="0"/>
+                <a:ea typeface="Times New Roman" panose="02020603050405020304" pitchFamily="18" charset="0"/>
+                <a:cs typeface="Courier New" panose="02070309020205020404" pitchFamily="49" charset="0"/>
+              </a:rPr>
+              <a:t>Pr</a:t>
+            </a:r>
+            <a:r>
+              <a:rPr kumimoji="0" lang="en-US" altLang="en-US" sz="1000" b="0" i="0" u="none" strike="noStrike" cap="none" normalizeH="0" baseline="0" dirty="0" smtClean="0">
+                <a:ln>
+                  <a:noFill/>
+                </a:ln>
+                <a:solidFill>
+                  <a:srgbClr val="000000"/>
+                </a:solidFill>
+                <a:effectLst/>
+                <a:latin typeface="Lucida Console" panose="020B0609040504020204" pitchFamily="49" charset="0"/>
+                <a:ea typeface="Times New Roman" panose="02020603050405020304" pitchFamily="18" charset="0"/>
+                <a:cs typeface="Courier New" panose="02070309020205020404" pitchFamily="49" charset="0"/>
+              </a:rPr>
+              <a:t>(&gt;|t|)   </a:t>
+            </a:r>
+          </a:p>
+          <a:p>
+            <a:pPr marL="0" marR="0" lvl="0" indent="0" algn="l" defTabSz="914400" rtl="0" eaLnBrk="0" fontAlgn="base" latinLnBrk="0" hangingPunct="0">
+              <a:lnSpc>
+                <a:spcPct val="100000"/>
+              </a:lnSpc>
+              <a:spcBef>
+                <a:spcPct val="0"/>
+              </a:spcBef>
+              <a:spcAft>
+                <a:spcPct val="0"/>
+              </a:spcAft>
+              <a:buClrTx/>
+              <a:buSzTx/>
+              <a:buFontTx/>
+              <a:buNone/>
+              <a:tabLst/>
+            </a:pPr>
+            <a:r>
+              <a:rPr kumimoji="0" lang="en-US" altLang="en-US" sz="1000" b="0" i="0" u="none" strike="noStrike" cap="none" normalizeH="0" baseline="0" dirty="0" smtClean="0">
+                <a:ln>
+                  <a:noFill/>
+                </a:ln>
+                <a:solidFill>
+                  <a:srgbClr val="000000"/>
+                </a:solidFill>
+                <a:effectLst/>
+                <a:latin typeface="Lucida Console" panose="020B0609040504020204" pitchFamily="49" charset="0"/>
+                <a:ea typeface="Times New Roman" panose="02020603050405020304" pitchFamily="18" charset="0"/>
+                <a:cs typeface="Courier New" panose="02070309020205020404" pitchFamily="49" charset="0"/>
+              </a:rPr>
+              <a:t>(Intercept)</a:t>
+            </a:r>
+            <a:r>
+              <a:rPr kumimoji="0" lang="en-US" altLang="en-US" sz="1000" b="0" i="0" u="none" strike="noStrike" cap="none" normalizeH="0" dirty="0" smtClean="0">
+                <a:ln>
+                  <a:noFill/>
+                </a:ln>
+                <a:solidFill>
+                  <a:srgbClr val="000000"/>
+                </a:solidFill>
+                <a:effectLst/>
+                <a:latin typeface="Lucida Console" panose="020B0609040504020204" pitchFamily="49" charset="0"/>
+                <a:ea typeface="Times New Roman" panose="02020603050405020304" pitchFamily="18" charset="0"/>
+                <a:cs typeface="Courier New" panose="02070309020205020404" pitchFamily="49" charset="0"/>
+              </a:rPr>
+              <a:t> </a:t>
+            </a:r>
+            <a:r>
+              <a:rPr kumimoji="0" lang="en-US" altLang="en-US" sz="1000" b="0" i="0" u="none" strike="noStrike" cap="none" normalizeH="0" baseline="0" dirty="0" smtClean="0">
+                <a:ln>
+                  <a:noFill/>
+                </a:ln>
+                <a:solidFill>
+                  <a:srgbClr val="000000"/>
+                </a:solidFill>
+                <a:effectLst/>
+                <a:latin typeface="Lucida Console" panose="020B0609040504020204" pitchFamily="49" charset="0"/>
+                <a:ea typeface="Times New Roman" panose="02020603050405020304" pitchFamily="18" charset="0"/>
+                <a:cs typeface="Courier New" panose="02070309020205020404" pitchFamily="49" charset="0"/>
+              </a:rPr>
+              <a:t>1.03769    0.39138   2.651  0.01532 * </a:t>
+            </a:r>
+          </a:p>
+          <a:p>
+            <a:pPr marL="0" marR="0" lvl="0" indent="0" algn="l" defTabSz="914400" rtl="0" eaLnBrk="0" fontAlgn="base" latinLnBrk="0" hangingPunct="0">
+              <a:lnSpc>
+                <a:spcPct val="100000"/>
+              </a:lnSpc>
+              <a:spcBef>
+                <a:spcPct val="0"/>
+              </a:spcBef>
+              <a:spcAft>
+                <a:spcPct val="0"/>
+              </a:spcAft>
+              <a:buClrTx/>
+              <a:buSzTx/>
+              <a:buFontTx/>
+              <a:buNone/>
+              <a:tabLst/>
+            </a:pPr>
+            <a:r>
+              <a:rPr kumimoji="0" lang="en-US" altLang="en-US" sz="1000" b="0" i="0" u="none" strike="noStrike" cap="none" normalizeH="0" baseline="0" dirty="0" smtClean="0">
+                <a:ln>
+                  <a:noFill/>
+                </a:ln>
+                <a:solidFill>
+                  <a:srgbClr val="000000"/>
+                </a:solidFill>
+                <a:effectLst/>
+                <a:latin typeface="Lucida Console" panose="020B0609040504020204" pitchFamily="49" charset="0"/>
+                <a:ea typeface="Times New Roman" panose="02020603050405020304" pitchFamily="18" charset="0"/>
+                <a:cs typeface="Courier New" panose="02070309020205020404" pitchFamily="49" charset="0"/>
+              </a:rPr>
+              <a:t>ioiha_response_001  0.00596    0.06214   0.096  0.92454   </a:t>
+            </a:r>
+          </a:p>
+          <a:p>
+            <a:pPr marL="0" marR="0" lvl="0" indent="0" algn="l" defTabSz="914400" rtl="0" eaLnBrk="0" fontAlgn="base" latinLnBrk="0" hangingPunct="0">
+              <a:lnSpc>
+                <a:spcPct val="100000"/>
+              </a:lnSpc>
+              <a:spcBef>
+                <a:spcPct val="0"/>
+              </a:spcBef>
+              <a:spcAft>
+                <a:spcPct val="0"/>
+              </a:spcAft>
+              <a:buClrTx/>
+              <a:buSzTx/>
+              <a:buFontTx/>
+              <a:buNone/>
+              <a:tabLst/>
+            </a:pPr>
+            <a:r>
+              <a:rPr kumimoji="0" lang="en-US" altLang="en-US" sz="1000" b="0" i="0" u="none" strike="noStrike" cap="none" normalizeH="0" baseline="0" dirty="0" smtClean="0">
+                <a:ln>
+                  <a:noFill/>
+                </a:ln>
+                <a:solidFill>
+                  <a:srgbClr val="000000"/>
+                </a:solidFill>
+                <a:effectLst/>
+                <a:latin typeface="Lucida Console" panose="020B0609040504020204" pitchFamily="49" charset="0"/>
+                <a:ea typeface="Times New Roman" panose="02020603050405020304" pitchFamily="18" charset="0"/>
+                <a:cs typeface="Courier New" panose="02070309020205020404" pitchFamily="49" charset="0"/>
+              </a:rPr>
+              <a:t>ioiha_response_002 -0.28609    0.09801  -2.919  0.00849 **</a:t>
+            </a:r>
+          </a:p>
+          <a:p>
+            <a:pPr marL="0" marR="0" lvl="0" indent="0" algn="l" defTabSz="914400" rtl="0" eaLnBrk="0" fontAlgn="base" latinLnBrk="0" hangingPunct="0">
+              <a:lnSpc>
+                <a:spcPct val="100000"/>
+              </a:lnSpc>
+              <a:spcBef>
+                <a:spcPct val="0"/>
+              </a:spcBef>
+              <a:spcAft>
+                <a:spcPct val="0"/>
+              </a:spcAft>
+              <a:buClrTx/>
+              <a:buSzTx/>
+              <a:buFontTx/>
+              <a:buNone/>
+              <a:tabLst/>
+            </a:pPr>
+            <a:r>
+              <a:rPr kumimoji="0" lang="en-US" altLang="en-US" sz="1000" b="0" i="0" u="none" strike="noStrike" cap="none" normalizeH="0" baseline="0" dirty="0" smtClean="0">
+                <a:ln>
+                  <a:noFill/>
+                </a:ln>
+                <a:solidFill>
+                  <a:srgbClr val="000000"/>
+                </a:solidFill>
+                <a:effectLst/>
+                <a:latin typeface="Lucida Console" panose="020B0609040504020204" pitchFamily="49" charset="0"/>
+                <a:ea typeface="Times New Roman" panose="02020603050405020304" pitchFamily="18" charset="0"/>
+                <a:cs typeface="Courier New" panose="02070309020205020404" pitchFamily="49" charset="0"/>
+              </a:rPr>
+              <a:t>ioiha_response_003  0.07585    0.08924   0.850  0.40545   </a:t>
+            </a:r>
+          </a:p>
+          <a:p>
+            <a:pPr marL="0" marR="0" lvl="0" indent="0" algn="l" defTabSz="914400" rtl="0" eaLnBrk="0" fontAlgn="base" latinLnBrk="0" hangingPunct="0">
+              <a:lnSpc>
+                <a:spcPct val="100000"/>
+              </a:lnSpc>
+              <a:spcBef>
+                <a:spcPct val="0"/>
+              </a:spcBef>
+              <a:spcAft>
+                <a:spcPct val="0"/>
+              </a:spcAft>
+              <a:buClrTx/>
+              <a:buSzTx/>
+              <a:buFontTx/>
+              <a:buNone/>
+              <a:tabLst/>
+            </a:pPr>
+            <a:r>
+              <a:rPr kumimoji="0" lang="en-US" altLang="en-US" sz="1000" b="0" i="0" u="none" strike="noStrike" cap="none" normalizeH="0" baseline="0" dirty="0" smtClean="0">
+                <a:ln>
+                  <a:noFill/>
+                </a:ln>
+                <a:solidFill>
+                  <a:srgbClr val="000000"/>
+                </a:solidFill>
+                <a:effectLst/>
+                <a:latin typeface="Lucida Console" panose="020B0609040504020204" pitchFamily="49" charset="0"/>
+                <a:ea typeface="Times New Roman" panose="02020603050405020304" pitchFamily="18" charset="0"/>
+                <a:cs typeface="Courier New" panose="02070309020205020404" pitchFamily="49" charset="0"/>
+              </a:rPr>
+              <a:t>ioiha_response_004  0.12792    0.09585   1.334  0.19704   </a:t>
+            </a:r>
+          </a:p>
+          <a:p>
+            <a:pPr marL="0" marR="0" lvl="0" indent="0" algn="l" defTabSz="914400" rtl="0" eaLnBrk="0" fontAlgn="base" latinLnBrk="0" hangingPunct="0">
+              <a:lnSpc>
+                <a:spcPct val="100000"/>
+              </a:lnSpc>
+              <a:spcBef>
+                <a:spcPct val="0"/>
+              </a:spcBef>
+              <a:spcAft>
+                <a:spcPct val="0"/>
+              </a:spcAft>
+              <a:buClrTx/>
+              <a:buSzTx/>
+              <a:buFontTx/>
+              <a:buNone/>
+              <a:tabLst/>
+            </a:pPr>
+            <a:r>
+              <a:rPr kumimoji="0" lang="en-US" altLang="en-US" sz="1000" b="0" i="0" u="none" strike="noStrike" cap="none" normalizeH="0" baseline="0" dirty="0" smtClean="0">
+                <a:ln>
+                  <a:noFill/>
+                </a:ln>
+                <a:solidFill>
+                  <a:srgbClr val="000000"/>
+                </a:solidFill>
+                <a:effectLst/>
+                <a:latin typeface="Lucida Console" panose="020B0609040504020204" pitchFamily="49" charset="0"/>
+                <a:ea typeface="Times New Roman" panose="02020603050405020304" pitchFamily="18" charset="0"/>
+                <a:cs typeface="Courier New" panose="02070309020205020404" pitchFamily="49" charset="0"/>
+              </a:rPr>
+              <a:t>ioiha_response_005  0.02994    0.04673   0.641  0.52901   </a:t>
+            </a:r>
+          </a:p>
+          <a:p>
+            <a:pPr marL="0" marR="0" lvl="0" indent="0" algn="l" defTabSz="914400" rtl="0" eaLnBrk="0" fontAlgn="base" latinLnBrk="0" hangingPunct="0">
+              <a:lnSpc>
+                <a:spcPct val="100000"/>
+              </a:lnSpc>
+              <a:spcBef>
+                <a:spcPct val="0"/>
+              </a:spcBef>
+              <a:spcAft>
+                <a:spcPct val="0"/>
+              </a:spcAft>
+              <a:buClrTx/>
+              <a:buSzTx/>
+              <a:buFontTx/>
+              <a:buNone/>
+              <a:tabLst/>
+            </a:pPr>
+            <a:r>
+              <a:rPr kumimoji="0" lang="en-US" altLang="en-US" sz="1000" b="0" i="0" u="none" strike="noStrike" cap="none" normalizeH="0" baseline="0" dirty="0" smtClean="0">
+                <a:ln>
+                  <a:noFill/>
+                </a:ln>
+                <a:solidFill>
+                  <a:srgbClr val="000000"/>
+                </a:solidFill>
+                <a:effectLst/>
+                <a:latin typeface="Lucida Console" panose="020B0609040504020204" pitchFamily="49" charset="0"/>
+                <a:ea typeface="Times New Roman" panose="02020603050405020304" pitchFamily="18" charset="0"/>
+                <a:cs typeface="Courier New" panose="02070309020205020404" pitchFamily="49" charset="0"/>
+              </a:rPr>
+              <a:t>ioiha_response_006 -0.12816    0.07006  -1.829  0.08230 . </a:t>
+            </a:r>
+          </a:p>
+          <a:p>
+            <a:pPr marL="0" marR="0" lvl="0" indent="0" algn="l" defTabSz="914400" rtl="0" eaLnBrk="0" fontAlgn="base" latinLnBrk="0" hangingPunct="0">
+              <a:lnSpc>
+                <a:spcPct val="100000"/>
+              </a:lnSpc>
+              <a:spcBef>
+                <a:spcPct val="0"/>
+              </a:spcBef>
+              <a:spcAft>
+                <a:spcPct val="0"/>
+              </a:spcAft>
+              <a:buClrTx/>
+              <a:buSzTx/>
+              <a:buFontTx/>
+              <a:buNone/>
+              <a:tabLst/>
+            </a:pPr>
+            <a:r>
+              <a:rPr kumimoji="0" lang="en-US" altLang="en-US" sz="1000" b="0" i="0" u="none" strike="noStrike" cap="none" normalizeH="0" baseline="0" dirty="0" smtClean="0">
+                <a:ln>
+                  <a:noFill/>
+                </a:ln>
+                <a:solidFill>
+                  <a:srgbClr val="000000"/>
+                </a:solidFill>
+                <a:effectLst/>
+                <a:latin typeface="Lucida Console" panose="020B0609040504020204" pitchFamily="49" charset="0"/>
+                <a:ea typeface="Times New Roman" panose="02020603050405020304" pitchFamily="18" charset="0"/>
+                <a:cs typeface="Courier New" panose="02070309020205020404" pitchFamily="49" charset="0"/>
+              </a:rPr>
+              <a:t>ioiha_response_007  0.07116    0.08530   0.834  0.41396   </a:t>
+            </a:r>
+          </a:p>
+          <a:p>
+            <a:pPr marL="0" marR="0" lvl="0" indent="0" algn="l" defTabSz="914400" rtl="0" eaLnBrk="0" fontAlgn="base" latinLnBrk="0" hangingPunct="0">
+              <a:lnSpc>
+                <a:spcPct val="100000"/>
+              </a:lnSpc>
+              <a:spcBef>
+                <a:spcPct val="0"/>
+              </a:spcBef>
+              <a:spcAft>
+                <a:spcPct val="0"/>
+              </a:spcAft>
+              <a:buClrTx/>
+              <a:buSzTx/>
+              <a:buFontTx/>
+              <a:buNone/>
+              <a:tabLst/>
+            </a:pPr>
+            <a:r>
+              <a:rPr kumimoji="0" lang="en-US" altLang="en-US" sz="1000" b="0" i="0" u="none" strike="noStrike" cap="none" normalizeH="0" baseline="0" dirty="0" smtClean="0">
+                <a:ln>
+                  <a:noFill/>
+                </a:ln>
+                <a:solidFill>
+                  <a:srgbClr val="000000"/>
+                </a:solidFill>
+                <a:effectLst/>
+                <a:latin typeface="Lucida Console" panose="020B0609040504020204" pitchFamily="49" charset="0"/>
+                <a:ea typeface="Times New Roman" panose="02020603050405020304" pitchFamily="18" charset="0"/>
+                <a:cs typeface="Courier New" panose="02070309020205020404" pitchFamily="49" charset="0"/>
+              </a:rPr>
+              <a:t>---</a:t>
+            </a:r>
+          </a:p>
+          <a:p>
+            <a:pPr marL="0" marR="0" lvl="0" indent="0" algn="l" defTabSz="914400" rtl="0" eaLnBrk="0" fontAlgn="base" latinLnBrk="0" hangingPunct="0">
+              <a:lnSpc>
+                <a:spcPct val="100000"/>
+              </a:lnSpc>
+              <a:spcBef>
+                <a:spcPct val="0"/>
+              </a:spcBef>
+              <a:spcAft>
+                <a:spcPct val="0"/>
+              </a:spcAft>
+              <a:buClrTx/>
+              <a:buSzTx/>
+              <a:buFontTx/>
+              <a:buNone/>
+              <a:tabLst/>
+            </a:pPr>
+            <a:r>
+              <a:rPr kumimoji="0" lang="en-US" altLang="en-US" sz="1000" b="0" i="0" u="none" strike="noStrike" cap="none" normalizeH="0" baseline="0" dirty="0" err="1" smtClean="0">
+                <a:ln>
+                  <a:noFill/>
+                </a:ln>
+                <a:solidFill>
+                  <a:srgbClr val="000000"/>
+                </a:solidFill>
+                <a:effectLst/>
+                <a:latin typeface="Lucida Console" panose="020B0609040504020204" pitchFamily="49" charset="0"/>
+                <a:ea typeface="Times New Roman" panose="02020603050405020304" pitchFamily="18" charset="0"/>
+                <a:cs typeface="Courier New" panose="02070309020205020404" pitchFamily="49" charset="0"/>
+              </a:rPr>
+              <a:t>Signif</a:t>
+            </a:r>
+            <a:r>
+              <a:rPr kumimoji="0" lang="en-US" altLang="en-US" sz="1000" b="0" i="0" u="none" strike="noStrike" cap="none" normalizeH="0" baseline="0" dirty="0" smtClean="0">
+                <a:ln>
+                  <a:noFill/>
+                </a:ln>
+                <a:solidFill>
+                  <a:srgbClr val="000000"/>
+                </a:solidFill>
+                <a:effectLst/>
+                <a:latin typeface="Lucida Console" panose="020B0609040504020204" pitchFamily="49" charset="0"/>
+                <a:ea typeface="Times New Roman" panose="02020603050405020304" pitchFamily="18" charset="0"/>
+                <a:cs typeface="Courier New" panose="02070309020205020404" pitchFamily="49" charset="0"/>
+              </a:rPr>
+              <a:t>. codes:  0 ‘***’ 0.001 ‘**’ 0.01 ‘*’ 0.05 ‘.’ 0.1 ‘ ’ 1</a:t>
+            </a:r>
+          </a:p>
+          <a:p>
+            <a:pPr marL="0" marR="0" lvl="0" indent="0" algn="l" defTabSz="914400" rtl="0" eaLnBrk="0" fontAlgn="base" latinLnBrk="0" hangingPunct="0">
+              <a:lnSpc>
+                <a:spcPct val="100000"/>
+              </a:lnSpc>
+              <a:spcBef>
+                <a:spcPct val="0"/>
+              </a:spcBef>
+              <a:spcAft>
+                <a:spcPct val="0"/>
+              </a:spcAft>
+              <a:buClrTx/>
+              <a:buSzTx/>
+              <a:buFontTx/>
+              <a:buNone/>
+              <a:tabLst/>
+            </a:pPr>
+            <a:endParaRPr lang="en-US" altLang="en-US" sz="1000" dirty="0">
+              <a:solidFill>
+                <a:srgbClr val="000000"/>
+              </a:solidFill>
+              <a:latin typeface="Lucida Console" panose="020B0609040504020204" pitchFamily="49" charset="0"/>
+              <a:ea typeface="Times New Roman" panose="02020603050405020304" pitchFamily="18" charset="0"/>
+              <a:cs typeface="Courier New" panose="02070309020205020404" pitchFamily="49" charset="0"/>
+            </a:endParaRPr>
+          </a:p>
+          <a:p>
+            <a:pPr marL="0" marR="0" lvl="0" indent="0" algn="l" defTabSz="914400" rtl="0" eaLnBrk="0" fontAlgn="base" latinLnBrk="0" hangingPunct="0">
+              <a:lnSpc>
+                <a:spcPct val="100000"/>
+              </a:lnSpc>
+              <a:spcBef>
+                <a:spcPct val="0"/>
+              </a:spcBef>
+              <a:spcAft>
+                <a:spcPct val="0"/>
+              </a:spcAft>
+              <a:buClrTx/>
+              <a:buSzTx/>
+              <a:buFontTx/>
+              <a:buNone/>
+              <a:tabLst/>
+            </a:pPr>
+            <a:r>
+              <a:rPr kumimoji="0" lang="en-US" altLang="en-US" sz="1000" b="0" i="0" u="none" strike="noStrike" cap="none" normalizeH="0" baseline="0" dirty="0" smtClean="0">
+                <a:ln>
+                  <a:noFill/>
+                </a:ln>
+                <a:solidFill>
+                  <a:srgbClr val="000000"/>
+                </a:solidFill>
+                <a:effectLst/>
+                <a:latin typeface="Lucida Console" panose="020B0609040504020204" pitchFamily="49" charset="0"/>
+                <a:ea typeface="Times New Roman" panose="02020603050405020304" pitchFamily="18" charset="0"/>
+                <a:cs typeface="Courier New" panose="02070309020205020404" pitchFamily="49" charset="0"/>
+              </a:rPr>
+              <a:t>Residual standard error: 0.2128 on 20 degrees of freedom</a:t>
+            </a:r>
+          </a:p>
+          <a:p>
+            <a:pPr marL="0" marR="0" lvl="0" indent="0" algn="l" defTabSz="914400" rtl="0" eaLnBrk="0" fontAlgn="base" latinLnBrk="0" hangingPunct="0">
+              <a:lnSpc>
+                <a:spcPct val="100000"/>
+              </a:lnSpc>
+              <a:spcBef>
+                <a:spcPct val="0"/>
+              </a:spcBef>
+              <a:spcAft>
+                <a:spcPct val="0"/>
+              </a:spcAft>
+              <a:buClrTx/>
+              <a:buSzTx/>
+              <a:buFontTx/>
+              <a:buNone/>
+              <a:tabLst/>
+            </a:pPr>
+            <a:r>
+              <a:rPr kumimoji="0" lang="en-US" altLang="en-US" sz="1000" b="0" i="0" u="none" strike="noStrike" cap="none" normalizeH="0" baseline="0" dirty="0" smtClean="0">
+                <a:ln>
+                  <a:noFill/>
+                </a:ln>
+                <a:solidFill>
+                  <a:srgbClr val="000000"/>
+                </a:solidFill>
+                <a:effectLst/>
+                <a:latin typeface="Lucida Console" panose="020B0609040504020204" pitchFamily="49" charset="0"/>
+                <a:ea typeface="Times New Roman" panose="02020603050405020304" pitchFamily="18" charset="0"/>
+                <a:cs typeface="Courier New" panose="02070309020205020404" pitchFamily="49" charset="0"/>
+              </a:rPr>
+              <a:t>Multiple R-squared:  0.4068,	Adjusted R-squared:  0.1992 </a:t>
+            </a:r>
+          </a:p>
+          <a:p>
+            <a:pPr marL="0" marR="0" lvl="0" indent="0" algn="l" defTabSz="914400" rtl="0" eaLnBrk="0" fontAlgn="base" latinLnBrk="0" hangingPunct="0">
+              <a:lnSpc>
+                <a:spcPct val="100000"/>
+              </a:lnSpc>
+              <a:spcBef>
+                <a:spcPct val="0"/>
+              </a:spcBef>
+              <a:spcAft>
+                <a:spcPct val="0"/>
+              </a:spcAft>
+              <a:buClrTx/>
+              <a:buSzTx/>
+              <a:buFontTx/>
+              <a:buNone/>
+              <a:tabLst/>
+            </a:pPr>
+            <a:r>
+              <a:rPr kumimoji="0" lang="en-US" altLang="en-US" sz="1000" b="0" i="0" u="none" strike="noStrike" cap="none" normalizeH="0" baseline="0" dirty="0" smtClean="0">
+                <a:ln>
+                  <a:noFill/>
+                </a:ln>
+                <a:solidFill>
+                  <a:srgbClr val="000000"/>
+                </a:solidFill>
+                <a:effectLst/>
+                <a:latin typeface="Lucida Console" panose="020B0609040504020204" pitchFamily="49" charset="0"/>
+                <a:ea typeface="Times New Roman" panose="02020603050405020304" pitchFamily="18" charset="0"/>
+                <a:cs typeface="Courier New" panose="02070309020205020404" pitchFamily="49" charset="0"/>
+              </a:rPr>
+              <a:t>F-statistic:  1.96 on 7 and 20 DF,  p-value: 0.1126</a:t>
+            </a:r>
+            <a:r>
+              <a:rPr kumimoji="0" lang="en-US" altLang="en-US" sz="800" b="0" i="0" u="none" strike="noStrike" cap="none" normalizeH="0" baseline="0" dirty="0" smtClean="0">
+                <a:ln>
+                  <a:noFill/>
+                </a:ln>
+                <a:solidFill>
+                  <a:schemeClr val="tx1"/>
+                </a:solidFill>
+                <a:effectLst/>
+              </a:rPr>
+              <a:t> </a:t>
+            </a:r>
+            <a:endParaRPr kumimoji="0" lang="en-US" altLang="en-US" sz="1800" b="0" i="0" u="none" strike="noStrike" cap="none" normalizeH="0" baseline="0" dirty="0" smtClean="0">
+              <a:ln>
+                <a:noFill/>
+              </a:ln>
+              <a:solidFill>
+                <a:schemeClr val="tx1"/>
+              </a:solidFill>
+              <a:effectLst/>
+              <a:latin typeface="Arial" panose="020B0604020202020204" pitchFamily="34" charset="0"/>
+            </a:endParaRPr>
           </a:p>
         </p:txBody>
       </p:sp>
     </p:spTree>
     <p:extLst>
       <p:ext uri="{BB962C8B-B14F-4D97-AF65-F5344CB8AC3E}">
-        <p14:creationId xmlns:p14="http://schemas.microsoft.com/office/powerpoint/2010/main" val="2108271302"/>
+        <p14:creationId xmlns:p14="http://schemas.microsoft.com/office/powerpoint/2010/main" val="3681922557"/>
       </p:ext>
     </p:extLst>
   </p:cSld>
   <p:clrMapOvr>
     <a:masterClrMapping/>
   </p:clrMapOvr>
-  <p:timing>
-    <p:tnLst>
-      <p:par>
-        <p:cTn id="1" dur="indefinite" restart="never" nodeType="tmRoot"/>
-      </p:par>
-    </p:tnLst>
-  </p:timing>
 </p:sld>
 </file>
 

</xml_diff>